<commit_message>
Deleted spurious template slide
</commit_message>
<xml_diff>
--- a/Team 55 Project Plan.pptx
+++ b/Team 55 Project Plan.pptx
@@ -6,22 +6,21 @@
     <p:sldMasterId id="2147483680" r:id="rId2"/>
   </p:sldMasterIdLst>
   <p:notesMasterIdLst>
-    <p:notesMasterId r:id="rId16"/>
+    <p:notesMasterId r:id="rId15"/>
   </p:notesMasterIdLst>
   <p:sldIdLst>
     <p:sldId id="265" r:id="rId3"/>
-    <p:sldId id="266" r:id="rId4"/>
-    <p:sldId id="260" r:id="rId5"/>
-    <p:sldId id="261" r:id="rId6"/>
-    <p:sldId id="262" r:id="rId7"/>
-    <p:sldId id="264" r:id="rId8"/>
-    <p:sldId id="263" r:id="rId9"/>
-    <p:sldId id="270" r:id="rId10"/>
-    <p:sldId id="271" r:id="rId11"/>
-    <p:sldId id="259" r:id="rId12"/>
-    <p:sldId id="267" r:id="rId13"/>
-    <p:sldId id="268" r:id="rId14"/>
-    <p:sldId id="269" r:id="rId15"/>
+    <p:sldId id="260" r:id="rId4"/>
+    <p:sldId id="261" r:id="rId5"/>
+    <p:sldId id="262" r:id="rId6"/>
+    <p:sldId id="264" r:id="rId7"/>
+    <p:sldId id="263" r:id="rId8"/>
+    <p:sldId id="270" r:id="rId9"/>
+    <p:sldId id="271" r:id="rId10"/>
+    <p:sldId id="259" r:id="rId11"/>
+    <p:sldId id="267" r:id="rId12"/>
+    <p:sldId id="268" r:id="rId13"/>
+    <p:sldId id="269" r:id="rId14"/>
   </p:sldIdLst>
   <p:sldSz cx="9144000" cy="6858000" type="screen4x3"/>
   <p:notesSz cx="6858000" cy="9144000"/>
@@ -557,7 +556,7 @@
           <a:p>
             <a:fld id="{58C53205-88F7-494A-B204-E8144581CAEF}" type="slidenum">
               <a:rPr lang="en-US" smtClean="0"/>
-              <a:t>4</a:t>
+              <a:t>3</a:t>
             </a:fld>
             <a:endParaRPr lang="en-US"/>
           </a:p>
@@ -4253,46 +4252,6 @@
       </p:grpSpPr>
       <p:sp>
         <p:nvSpPr>
-          <p:cNvPr id="3" name="Text Placeholder 2"/>
-          <p:cNvSpPr>
-            <a:spLocks noGrp="1"/>
-          </p:cNvSpPr>
-          <p:nvPr>
-            <p:ph idx="1"/>
-          </p:nvPr>
-        </p:nvSpPr>
-        <p:spPr/>
-        <p:txBody>
-          <a:bodyPr/>
-          <a:lstStyle/>
-          <a:p>
-            <a:r>
-              <a:rPr lang="en-US" dirty="0" smtClean="0"/>
-              <a:t>Key development tasks are translation of sections of NFIRS Casualty form to FHIR standard</a:t>
-            </a:r>
-          </a:p>
-          <a:p>
-            <a:r>
-              <a:rPr lang="en-US" dirty="0" smtClean="0"/>
-              <a:t>QA follows behind translation, ensuring correctness</a:t>
-            </a:r>
-          </a:p>
-          <a:p>
-            <a:r>
-              <a:rPr lang="en-US" dirty="0" smtClean="0"/>
-              <a:t>Final deliverable is implementation guide</a:t>
-            </a:r>
-          </a:p>
-          <a:p>
-            <a:endParaRPr lang="en-US" dirty="0" smtClean="0"/>
-          </a:p>
-          <a:p>
-            <a:endParaRPr lang="en-US" dirty="0"/>
-          </a:p>
-        </p:txBody>
-      </p:sp>
-      <p:sp>
-        <p:nvSpPr>
           <p:cNvPr id="6" name="Date Placeholder 5"/>
           <p:cNvSpPr>
             <a:spLocks noGrp="1"/>
@@ -4333,185 +4292,6 @@
               <a:rPr lang="en-US" smtClean="0"/>
               <a:pPr/>
               <a:t>10</a:t>
-            </a:fld>
-            <a:endParaRPr lang="en-US" dirty="0"/>
-          </a:p>
-        </p:txBody>
-      </p:sp>
-      <p:sp>
-        <p:nvSpPr>
-          <p:cNvPr id="2" name="Title 1"/>
-          <p:cNvSpPr>
-            <a:spLocks noGrp="1"/>
-          </p:cNvSpPr>
-          <p:nvPr>
-            <p:ph type="title"/>
-          </p:nvPr>
-        </p:nvSpPr>
-        <p:spPr/>
-        <p:txBody>
-          <a:bodyPr/>
-          <a:lstStyle/>
-          <a:p>
-            <a:r>
-              <a:rPr lang="en-US" dirty="0" smtClean="0"/>
-              <a:t>Project Plan</a:t>
-            </a:r>
-            <a:endParaRPr lang="en-US" dirty="0"/>
-          </a:p>
-        </p:txBody>
-      </p:sp>
-      <p:pic>
-        <p:nvPicPr>
-          <p:cNvPr id="3074" name="Picture 2"/>
-          <p:cNvPicPr>
-            <a:picLocks noChangeAspect="1" noChangeArrowheads="1"/>
-          </p:cNvPicPr>
-          <p:nvPr/>
-        </p:nvPicPr>
-        <p:blipFill>
-          <a:blip r:embed="rId2">
-            <a:extLst>
-              <a:ext uri="{28A0092B-C50C-407E-A947-70E740481C1C}">
-                <a14:useLocalDpi xmlns:a14="http://schemas.microsoft.com/office/drawing/2010/main" val="0"/>
-              </a:ext>
-            </a:extLst>
-          </a:blip>
-          <a:srcRect/>
-          <a:stretch>
-            <a:fillRect/>
-          </a:stretch>
-        </p:blipFill>
-        <p:spPr bwMode="auto">
-          <a:xfrm>
-            <a:off x="466056" y="3442900"/>
-            <a:ext cx="8220744" cy="1281500"/>
-          </a:xfrm>
-          <a:prstGeom prst="rect">
-            <a:avLst/>
-          </a:prstGeom>
-          <a:noFill/>
-          <a:ln>
-            <a:noFill/>
-          </a:ln>
-          <a:effectLst/>
-          <a:extLst>
-            <a:ext uri="{909E8E84-426E-40DD-AFC4-6F175D3DCCD1}">
-              <a14:hiddenFill xmlns:a14="http://schemas.microsoft.com/office/drawing/2010/main">
-                <a:solidFill>
-                  <a:schemeClr val="accent1"/>
-                </a:solidFill>
-              </a14:hiddenFill>
-            </a:ext>
-            <a:ext uri="{91240B29-F687-4F45-9708-019B960494DF}">
-              <a14:hiddenLine xmlns:a14="http://schemas.microsoft.com/office/drawing/2010/main" w="9525">
-                <a:solidFill>
-                  <a:schemeClr val="tx1"/>
-                </a:solidFill>
-                <a:miter lim="800000"/>
-                <a:headEnd/>
-                <a:tailEnd/>
-              </a14:hiddenLine>
-            </a:ext>
-            <a:ext uri="{AF507438-7753-43E0-B8FC-AC1667EBCBE1}">
-              <a14:hiddenEffects xmlns:a14="http://schemas.microsoft.com/office/drawing/2010/main">
-                <a:effectLst>
-                  <a:outerShdw dist="35921" dir="2700000" algn="ctr" rotWithShape="0">
-                    <a:schemeClr val="bg2"/>
-                  </a:outerShdw>
-                </a:effectLst>
-              </a14:hiddenEffects>
-            </a:ext>
-          </a:extLst>
-        </p:spPr>
-      </p:pic>
-    </p:spTree>
-    <p:extLst>
-      <p:ext uri="{BB962C8B-B14F-4D97-AF65-F5344CB8AC3E}">
-        <p14:creationId xmlns:p14="http://schemas.microsoft.com/office/powerpoint/2010/main" val="1743519783"/>
-      </p:ext>
-    </p:extLst>
-  </p:cSld>
-  <p:clrMapOvr>
-    <a:masterClrMapping/>
-  </p:clrMapOvr>
-  <mc:AlternateContent xmlns:mc="http://schemas.openxmlformats.org/markup-compatibility/2006">
-    <mc:Choice xmlns:p14="http://schemas.microsoft.com/office/powerpoint/2010/main" Requires="p14">
-      <p:transition spd="slow" p14:dur="2000"/>
-    </mc:Choice>
-    <mc:Fallback>
-      <p:transition spd="slow"/>
-    </mc:Fallback>
-  </mc:AlternateContent>
-  <p:timing>
-    <p:tnLst>
-      <p:par>
-        <p:cTn id="1" dur="indefinite" restart="never" nodeType="tmRoot"/>
-      </p:par>
-    </p:tnLst>
-  </p:timing>
-</p:sld>
-</file>
-
-<file path=ppt/slides/slide11.xml><?xml version="1.0" encoding="utf-8"?>
-<p:sld xmlns:a="http://schemas.openxmlformats.org/drawingml/2006/main" xmlns:r="http://schemas.openxmlformats.org/officeDocument/2006/relationships" xmlns:p="http://schemas.openxmlformats.org/presentationml/2006/main" show="0">
-  <p:cSld>
-    <p:spTree>
-      <p:nvGrpSpPr>
-        <p:cNvPr id="1" name=""/>
-        <p:cNvGrpSpPr/>
-        <p:nvPr/>
-      </p:nvGrpSpPr>
-      <p:grpSpPr>
-        <a:xfrm>
-          <a:off x="0" y="0"/>
-          <a:ext cx="0" cy="0"/>
-          <a:chOff x="0" y="0"/>
-          <a:chExt cx="0" cy="0"/>
-        </a:xfrm>
-      </p:grpSpPr>
-      <p:sp>
-        <p:nvSpPr>
-          <p:cNvPr id="6" name="Date Placeholder 5"/>
-          <p:cNvSpPr>
-            <a:spLocks noGrp="1"/>
-          </p:cNvSpPr>
-          <p:nvPr>
-            <p:ph type="dt" sz="half" idx="10"/>
-          </p:nvPr>
-        </p:nvSpPr>
-        <p:spPr/>
-        <p:txBody>
-          <a:bodyPr/>
-          <a:lstStyle/>
-          <a:p>
-            <a:r>
-              <a:rPr lang="en-US" dirty="0" smtClean="0"/>
-              <a:t>9/20/2020</a:t>
-            </a:r>
-            <a:endParaRPr lang="en-US" dirty="0"/>
-          </a:p>
-        </p:txBody>
-      </p:sp>
-      <p:sp>
-        <p:nvSpPr>
-          <p:cNvPr id="5" name="Slide Number Placeholder 4"/>
-          <p:cNvSpPr>
-            <a:spLocks noGrp="1"/>
-          </p:cNvSpPr>
-          <p:nvPr>
-            <p:ph type="sldNum" sz="quarter" idx="12"/>
-          </p:nvPr>
-        </p:nvSpPr>
-        <p:spPr/>
-        <p:txBody>
-          <a:bodyPr/>
-          <a:lstStyle/>
-          <a:p>
-            <a:fld id="{079BB85F-8D7B-4121-93BF-56CC81854BC2}" type="slidenum">
-              <a:rPr lang="en-US" smtClean="0"/>
-              <a:pPr/>
-              <a:t>11</a:t>
             </a:fld>
             <a:endParaRPr lang="en-US" dirty="0"/>
           </a:p>
@@ -4632,7 +4412,7 @@
 </p:sld>
 </file>
 
-<file path=ppt/slides/slide12.xml><?xml version="1.0" encoding="utf-8"?>
+<file path=ppt/slides/slide11.xml><?xml version="1.0" encoding="utf-8"?>
 <p:sld xmlns:a="http://schemas.openxmlformats.org/drawingml/2006/main" xmlns:r="http://schemas.openxmlformats.org/officeDocument/2006/relationships" xmlns:p="http://schemas.openxmlformats.org/presentationml/2006/main" show="0">
   <p:cSld>
     <p:spTree>
@@ -4690,7 +4470,7 @@
             <a:fld id="{079BB85F-8D7B-4121-93BF-56CC81854BC2}" type="slidenum">
               <a:rPr lang="en-US" smtClean="0"/>
               <a:pPr/>
-              <a:t>12</a:t>
+              <a:t>11</a:t>
             </a:fld>
             <a:endParaRPr lang="en-US" dirty="0"/>
           </a:p>
@@ -4811,7 +4591,7 @@
 </p:sld>
 </file>
 
-<file path=ppt/slides/slide13.xml><?xml version="1.0" encoding="utf-8"?>
+<file path=ppt/slides/slide12.xml><?xml version="1.0" encoding="utf-8"?>
 <p:sld xmlns:a="http://schemas.openxmlformats.org/drawingml/2006/main" xmlns:r="http://schemas.openxmlformats.org/officeDocument/2006/relationships" xmlns:p="http://schemas.openxmlformats.org/presentationml/2006/main" show="0">
   <p:cSld>
     <p:spTree>
@@ -4957,13 +4737,7 @@
       </p:grpSpPr>
       <p:sp>
         <p:nvSpPr>
-          <p:cNvPr id="5" name="Content Placeholder 4">
-            <a:extLst>
-              <a:ext uri="{FF2B5EF4-FFF2-40B4-BE49-F238E27FC236}">
-                <a16:creationId xmlns:a16="http://schemas.microsoft.com/office/drawing/2014/main" xmlns="" id="{19ACE267-5498-454D-8569-493E6EDFE21F}"/>
-              </a:ext>
-            </a:extLst>
-          </p:cNvPr>
+          <p:cNvPr id="3" name="Text Placeholder 2"/>
           <p:cNvSpPr>
             <a:spLocks noGrp="1"/>
           </p:cNvSpPr>
@@ -4977,68 +4751,92 @@
           <a:lstStyle/>
           <a:p>
             <a:r>
-              <a:rPr lang="en-US" dirty="0"/>
-              <a:t>This is the first point.</a:t>
-            </a:r>
-          </a:p>
-          <a:p>
-            <a:r>
-              <a:rPr lang="en-US" dirty="0"/>
-              <a:t>Here’s a second point. Let’s make it a longer one and see how it wraps</a:t>
-            </a:r>
-          </a:p>
-          <a:p>
-            <a:pPr lvl="1"/>
-            <a:r>
-              <a:rPr lang="en-US" dirty="0"/>
-              <a:t>Example of a sub point.</a:t>
-            </a:r>
-          </a:p>
-          <a:p>
-            <a:pPr lvl="1"/>
-            <a:r>
-              <a:rPr lang="en-US" dirty="0"/>
-              <a:t>Another sub point</a:t>
-            </a:r>
-          </a:p>
-          <a:p>
-            <a:r>
-              <a:rPr lang="en-US" dirty="0"/>
-              <a:t>Look, I’m a third point.</a:t>
-            </a:r>
-          </a:p>
-          <a:p>
-            <a:pPr lvl="1"/>
-            <a:r>
-              <a:rPr lang="en-US" dirty="0"/>
-              <a:t>Subpoint example</a:t>
-            </a:r>
-          </a:p>
-          <a:p>
-            <a:pPr lvl="2"/>
-            <a:r>
-              <a:rPr lang="en-US" dirty="0"/>
-              <a:t>Sub-sub point example the first</a:t>
-            </a:r>
-          </a:p>
-          <a:p>
-            <a:pPr lvl="2"/>
-            <a:r>
-              <a:rPr lang="en-US" dirty="0"/>
-              <a:t>And the second</a:t>
-            </a:r>
-          </a:p>
-        </p:txBody>
-      </p:sp>
-      <p:sp>
-        <p:nvSpPr>
-          <p:cNvPr id="4" name="Title 3">
-            <a:extLst>
-              <a:ext uri="{FF2B5EF4-FFF2-40B4-BE49-F238E27FC236}">
-                <a16:creationId xmlns:a16="http://schemas.microsoft.com/office/drawing/2014/main" xmlns="" id="{096CCFBC-CEEA-8445-9C0A-80973839FEA5}"/>
-              </a:ext>
-            </a:extLst>
-          </p:cNvPr>
+              <a:rPr lang="en-US" dirty="0" smtClean="0"/>
+              <a:t>Introduction and Background</a:t>
+            </a:r>
+          </a:p>
+          <a:p>
+            <a:r>
+              <a:rPr lang="en-US" dirty="0" smtClean="0"/>
+              <a:t>Scope of National Fire Registry</a:t>
+            </a:r>
+          </a:p>
+          <a:p>
+            <a:r>
+              <a:rPr lang="en-US" dirty="0" smtClean="0"/>
+              <a:t>Our Role</a:t>
+            </a:r>
+          </a:p>
+          <a:p>
+            <a:r>
+              <a:rPr lang="en-US" dirty="0" smtClean="0"/>
+              <a:t>Solution Architecture</a:t>
+            </a:r>
+          </a:p>
+          <a:p>
+            <a:r>
+              <a:rPr lang="en-US" dirty="0" smtClean="0"/>
+              <a:t>Project Plan</a:t>
+            </a:r>
+          </a:p>
+          <a:p>
+            <a:endParaRPr lang="en-US" dirty="0" smtClean="0"/>
+          </a:p>
+          <a:p>
+            <a:endParaRPr lang="en-US" dirty="0"/>
+          </a:p>
+        </p:txBody>
+      </p:sp>
+      <p:sp>
+        <p:nvSpPr>
+          <p:cNvPr id="6" name="Date Placeholder 5"/>
+          <p:cNvSpPr>
+            <a:spLocks noGrp="1"/>
+          </p:cNvSpPr>
+          <p:nvPr>
+            <p:ph type="dt" sz="half" idx="10"/>
+          </p:nvPr>
+        </p:nvSpPr>
+        <p:spPr/>
+        <p:txBody>
+          <a:bodyPr/>
+          <a:lstStyle/>
+          <a:p>
+            <a:r>
+              <a:rPr lang="en-US" dirty="0" smtClean="0"/>
+              <a:t>09/20/2020</a:t>
+            </a:r>
+            <a:endParaRPr lang="en-US" dirty="0"/>
+          </a:p>
+        </p:txBody>
+      </p:sp>
+      <p:sp>
+        <p:nvSpPr>
+          <p:cNvPr id="5" name="Slide Number Placeholder 4"/>
+          <p:cNvSpPr>
+            <a:spLocks noGrp="1"/>
+          </p:cNvSpPr>
+          <p:nvPr>
+            <p:ph type="sldNum" sz="quarter" idx="12"/>
+          </p:nvPr>
+        </p:nvSpPr>
+        <p:spPr/>
+        <p:txBody>
+          <a:bodyPr/>
+          <a:lstStyle/>
+          <a:p>
+            <a:fld id="{079BB85F-8D7B-4121-93BF-56CC81854BC2}" type="slidenum">
+              <a:rPr lang="en-US" smtClean="0"/>
+              <a:pPr/>
+              <a:t>2</a:t>
+            </a:fld>
+            <a:endParaRPr lang="en-US" dirty="0"/>
+          </a:p>
+        </p:txBody>
+      </p:sp>
+      <p:sp>
+        <p:nvSpPr>
+          <p:cNvPr id="2" name="Title 1"/>
           <p:cNvSpPr>
             <a:spLocks noGrp="1"/>
           </p:cNvSpPr>
@@ -5052,22 +4850,30 @@
           <a:lstStyle/>
           <a:p>
             <a:r>
-              <a:rPr lang="en-US" dirty="0"/>
-              <a:t>A One-Line Headline</a:t>
-            </a:r>
+              <a:rPr lang="en-US" dirty="0" smtClean="0"/>
+              <a:t>Agenda</a:t>
+            </a:r>
+            <a:endParaRPr lang="en-US" dirty="0"/>
           </a:p>
         </p:txBody>
       </p:sp>
     </p:spTree>
     <p:extLst>
       <p:ext uri="{BB962C8B-B14F-4D97-AF65-F5344CB8AC3E}">
-        <p14:creationId xmlns:p14="http://schemas.microsoft.com/office/powerpoint/2010/main" val="4143322901"/>
+        <p14:creationId xmlns:p14="http://schemas.microsoft.com/office/powerpoint/2010/main" val="1323346351"/>
       </p:ext>
     </p:extLst>
   </p:cSld>
   <p:clrMapOvr>
     <a:masterClrMapping/>
   </p:clrMapOvr>
+  <p:timing>
+    <p:tnLst>
+      <p:par>
+        <p:cTn id="1" dur="indefinite" restart="never" nodeType="tmRoot"/>
+      </p:par>
+    </p:tnLst>
+  </p:timing>
 </p:sld>
 </file>
 
@@ -5105,31 +4911,26 @@
           <a:p>
             <a:r>
               <a:rPr lang="en-US" dirty="0" smtClean="0"/>
-              <a:t>Introduction and Background</a:t>
+              <a:t>Firefighters at higher risk for various cancers, respiratory conditions, etc.</a:t>
             </a:r>
           </a:p>
           <a:p>
             <a:r>
               <a:rPr lang="en-US" dirty="0" smtClean="0"/>
-              <a:t>Scope of National Fire Registry</a:t>
+              <a:t>Limited information on long-term health of firefighters</a:t>
             </a:r>
           </a:p>
           <a:p>
             <a:r>
               <a:rPr lang="en-US" dirty="0" smtClean="0"/>
-              <a:t>Our Role</a:t>
+              <a:t>Need for long-term medical information and inclusion of women and minorities</a:t>
             </a:r>
           </a:p>
           <a:p>
             <a:r>
               <a:rPr lang="en-US" dirty="0" smtClean="0"/>
-              <a:t>Project Plan</a:t>
-            </a:r>
-          </a:p>
-          <a:p>
-            <a:endParaRPr lang="en-US" dirty="0" smtClean="0"/>
-          </a:p>
-          <a:p>
+              <a:t>Creation spurred by passing of Firefighter Cancer Registry Act of 2018</a:t>
+            </a:r>
             <a:endParaRPr lang="en-US" dirty="0"/>
           </a:p>
         </p:txBody>
@@ -5151,7 +4952,7 @@
           <a:p>
             <a:r>
               <a:rPr lang="en-US" dirty="0" smtClean="0"/>
-              <a:t>09/20/2020</a:t>
+              <a:t>9/20/2020</a:t>
             </a:r>
             <a:endParaRPr lang="en-US" dirty="0"/>
           </a:p>
@@ -5193,12 +4994,14 @@
         </p:nvSpPr>
         <p:spPr/>
         <p:txBody>
-          <a:bodyPr/>
+          <a:bodyPr>
+            <a:normAutofit fontScale="90000"/>
+          </a:bodyPr>
           <a:lstStyle/>
           <a:p>
             <a:r>
               <a:rPr lang="en-US" dirty="0" smtClean="0"/>
-              <a:t>Agenda</a:t>
+              <a:t>Why create the National Firefighter Registry?</a:t>
             </a:r>
             <a:endParaRPr lang="en-US" dirty="0"/>
           </a:p>
@@ -5207,7 +5010,7 @@
     </p:spTree>
     <p:extLst>
       <p:ext uri="{BB962C8B-B14F-4D97-AF65-F5344CB8AC3E}">
-        <p14:creationId xmlns:p14="http://schemas.microsoft.com/office/powerpoint/2010/main" val="1323346351"/>
+        <p14:creationId xmlns:p14="http://schemas.microsoft.com/office/powerpoint/2010/main" val="754537252"/>
       </p:ext>
     </p:extLst>
   </p:cSld>
@@ -5258,26 +5061,22 @@
           <a:p>
             <a:r>
               <a:rPr lang="en-US" dirty="0" smtClean="0"/>
-              <a:t>Firefighters at higher risk for various cancers, respiratory conditions, etc.</a:t>
+              <a:t>CDC project to track health information of firefighters to analyze cancer trends</a:t>
             </a:r>
           </a:p>
           <a:p>
             <a:r>
               <a:rPr lang="en-US" dirty="0" smtClean="0"/>
-              <a:t>Limited information on long-term health of firefighters</a:t>
+              <a:t>Enrollment is on a volunteer basis</a:t>
             </a:r>
           </a:p>
           <a:p>
             <a:r>
               <a:rPr lang="en-US" dirty="0" smtClean="0"/>
-              <a:t>Need for long-term medical information and inclusion of women and minorities</a:t>
-            </a:r>
-          </a:p>
-          <a:p>
-            <a:r>
-              <a:rPr lang="en-US" dirty="0" smtClean="0"/>
-              <a:t>Creation spurred by passing of Firefighter Cancer Registry Act of 2018</a:t>
-            </a:r>
+              <a:t>Goal is &gt;200,000 firefighters enrolled</a:t>
+            </a:r>
+          </a:p>
+          <a:p>
             <a:endParaRPr lang="en-US" dirty="0"/>
           </a:p>
         </p:txBody>
@@ -5324,152 +5123,6 @@
               <a:rPr lang="en-US" smtClean="0"/>
               <a:pPr/>
               <a:t>4</a:t>
-            </a:fld>
-            <a:endParaRPr lang="en-US" dirty="0"/>
-          </a:p>
-        </p:txBody>
-      </p:sp>
-      <p:sp>
-        <p:nvSpPr>
-          <p:cNvPr id="2" name="Title 1"/>
-          <p:cNvSpPr>
-            <a:spLocks noGrp="1"/>
-          </p:cNvSpPr>
-          <p:nvPr>
-            <p:ph type="title"/>
-          </p:nvPr>
-        </p:nvSpPr>
-        <p:spPr/>
-        <p:txBody>
-          <a:bodyPr>
-            <a:normAutofit fontScale="90000"/>
-          </a:bodyPr>
-          <a:lstStyle/>
-          <a:p>
-            <a:r>
-              <a:rPr lang="en-US" dirty="0" smtClean="0"/>
-              <a:t>Why create the National Firefighter Registry?</a:t>
-            </a:r>
-            <a:endParaRPr lang="en-US" dirty="0"/>
-          </a:p>
-        </p:txBody>
-      </p:sp>
-    </p:spTree>
-    <p:extLst>
-      <p:ext uri="{BB962C8B-B14F-4D97-AF65-F5344CB8AC3E}">
-        <p14:creationId xmlns:p14="http://schemas.microsoft.com/office/powerpoint/2010/main" val="754537252"/>
-      </p:ext>
-    </p:extLst>
-  </p:cSld>
-  <p:clrMapOvr>
-    <a:masterClrMapping/>
-  </p:clrMapOvr>
-  <p:timing>
-    <p:tnLst>
-      <p:par>
-        <p:cTn id="1" dur="indefinite" restart="never" nodeType="tmRoot"/>
-      </p:par>
-    </p:tnLst>
-  </p:timing>
-</p:sld>
-</file>
-
-<file path=ppt/slides/slide5.xml><?xml version="1.0" encoding="utf-8"?>
-<p:sld xmlns:a="http://schemas.openxmlformats.org/drawingml/2006/main" xmlns:r="http://schemas.openxmlformats.org/officeDocument/2006/relationships" xmlns:p="http://schemas.openxmlformats.org/presentationml/2006/main">
-  <p:cSld>
-    <p:spTree>
-      <p:nvGrpSpPr>
-        <p:cNvPr id="1" name=""/>
-        <p:cNvGrpSpPr/>
-        <p:nvPr/>
-      </p:nvGrpSpPr>
-      <p:grpSpPr>
-        <a:xfrm>
-          <a:off x="0" y="0"/>
-          <a:ext cx="0" cy="0"/>
-          <a:chOff x="0" y="0"/>
-          <a:chExt cx="0" cy="0"/>
-        </a:xfrm>
-      </p:grpSpPr>
-      <p:sp>
-        <p:nvSpPr>
-          <p:cNvPr id="3" name="Text Placeholder 2"/>
-          <p:cNvSpPr>
-            <a:spLocks noGrp="1"/>
-          </p:cNvSpPr>
-          <p:nvPr>
-            <p:ph idx="1"/>
-          </p:nvPr>
-        </p:nvSpPr>
-        <p:spPr/>
-        <p:txBody>
-          <a:bodyPr/>
-          <a:lstStyle/>
-          <a:p>
-            <a:r>
-              <a:rPr lang="en-US" dirty="0" smtClean="0"/>
-              <a:t>CDC project to track health information of firefighters to analyze cancer trends</a:t>
-            </a:r>
-          </a:p>
-          <a:p>
-            <a:r>
-              <a:rPr lang="en-US" dirty="0" smtClean="0"/>
-              <a:t>Enrollment is on a volunteer basis</a:t>
-            </a:r>
-          </a:p>
-          <a:p>
-            <a:r>
-              <a:rPr lang="en-US" dirty="0" smtClean="0"/>
-              <a:t>Goal is &gt;200,000 firefighters enrolled</a:t>
-            </a:r>
-          </a:p>
-          <a:p>
-            <a:endParaRPr lang="en-US" dirty="0"/>
-          </a:p>
-        </p:txBody>
-      </p:sp>
-      <p:sp>
-        <p:nvSpPr>
-          <p:cNvPr id="6" name="Date Placeholder 5"/>
-          <p:cNvSpPr>
-            <a:spLocks noGrp="1"/>
-          </p:cNvSpPr>
-          <p:nvPr>
-            <p:ph type="dt" sz="half" idx="10"/>
-          </p:nvPr>
-        </p:nvSpPr>
-        <p:spPr/>
-        <p:txBody>
-          <a:bodyPr/>
-          <a:lstStyle/>
-          <a:p>
-            <a:r>
-              <a:rPr lang="en-US" dirty="0" smtClean="0"/>
-              <a:t>9/20/2020</a:t>
-            </a:r>
-            <a:endParaRPr lang="en-US" dirty="0"/>
-          </a:p>
-        </p:txBody>
-      </p:sp>
-      <p:sp>
-        <p:nvSpPr>
-          <p:cNvPr id="5" name="Slide Number Placeholder 4"/>
-          <p:cNvSpPr>
-            <a:spLocks noGrp="1"/>
-          </p:cNvSpPr>
-          <p:nvPr>
-            <p:ph type="sldNum" sz="quarter" idx="12"/>
-          </p:nvPr>
-        </p:nvSpPr>
-        <p:spPr/>
-        <p:txBody>
-          <a:bodyPr/>
-          <a:lstStyle/>
-          <a:p>
-            <a:fld id="{079BB85F-8D7B-4121-93BF-56CC81854BC2}" type="slidenum">
-              <a:rPr lang="en-US" smtClean="0"/>
-              <a:pPr/>
-              <a:t>5</a:t>
             </a:fld>
             <a:endParaRPr lang="en-US" dirty="0"/>
           </a:p>
@@ -5602,7 +5255,7 @@
 </p:sld>
 </file>
 
-<file path=ppt/slides/slide6.xml><?xml version="1.0" encoding="utf-8"?>
+<file path=ppt/slides/slide5.xml><?xml version="1.0" encoding="utf-8"?>
 <p:sld xmlns:a="http://schemas.openxmlformats.org/drawingml/2006/main" xmlns:r="http://schemas.openxmlformats.org/officeDocument/2006/relationships" xmlns:p="http://schemas.openxmlformats.org/presentationml/2006/main">
   <p:cSld>
     <p:spTree>
@@ -5713,7 +5366,7 @@
             <a:fld id="{079BB85F-8D7B-4121-93BF-56CC81854BC2}" type="slidenum">
               <a:rPr lang="en-US" smtClean="0"/>
               <a:pPr/>
-              <a:t>6</a:t>
+              <a:t>5</a:t>
             </a:fld>
             <a:endParaRPr lang="en-US" dirty="0"/>
           </a:p>
@@ -5822,7 +5475,7 @@
 </p:sld>
 </file>
 
-<file path=ppt/slides/slide7.xml><?xml version="1.0" encoding="utf-8"?>
+<file path=ppt/slides/slide6.xml><?xml version="1.0" encoding="utf-8"?>
 <p:sld xmlns:a="http://schemas.openxmlformats.org/drawingml/2006/main" xmlns:r="http://schemas.openxmlformats.org/officeDocument/2006/relationships" xmlns:p="http://schemas.openxmlformats.org/presentationml/2006/main">
   <p:cSld>
     <p:spTree>
@@ -5912,7 +5565,7 @@
             <a:fld id="{079BB85F-8D7B-4121-93BF-56CC81854BC2}" type="slidenum">
               <a:rPr lang="en-US" smtClean="0"/>
               <a:pPr/>
-              <a:t>7</a:t>
+              <a:t>6</a:t>
             </a:fld>
             <a:endParaRPr lang="en-US" dirty="0"/>
           </a:p>
@@ -6002,7 +5655,7 @@
 </p:sld>
 </file>
 
-<file path=ppt/slides/slide8.xml><?xml version="1.0" encoding="utf-8"?>
+<file path=ppt/slides/slide7.xml><?xml version="1.0" encoding="utf-8"?>
 <p:sld xmlns:a="http://schemas.openxmlformats.org/drawingml/2006/main" xmlns:r="http://schemas.openxmlformats.org/officeDocument/2006/relationships" xmlns:p="http://schemas.openxmlformats.org/presentationml/2006/main">
   <p:cSld>
     <p:spTree>
@@ -6067,8 +5720,8 @@
         </p:blipFill>
         <p:spPr bwMode="auto">
           <a:xfrm>
-            <a:off x="228600" y="1004887"/>
-            <a:ext cx="8795062" cy="5091113"/>
+            <a:off x="457200" y="1211901"/>
+            <a:ext cx="8305800" cy="4807899"/>
           </a:xfrm>
           <a:prstGeom prst="rect">
             <a:avLst/>
@@ -6121,7 +5774,7 @@
 </p:sld>
 </file>
 
-<file path=ppt/slides/slide9.xml><?xml version="1.0" encoding="utf-8"?>
+<file path=ppt/slides/slide8.xml><?xml version="1.0" encoding="utf-8"?>
 <p:sld xmlns:a="http://schemas.openxmlformats.org/drawingml/2006/main" xmlns:r="http://schemas.openxmlformats.org/officeDocument/2006/relationships" xmlns:p="http://schemas.openxmlformats.org/presentationml/2006/main" show="0">
   <p:cSld>
     <p:spTree>
@@ -6181,6 +5834,225 @@
       <p:transition spd="slow"/>
     </mc:Fallback>
   </mc:AlternateContent>
+</p:sld>
+</file>
+
+<file path=ppt/slides/slide9.xml><?xml version="1.0" encoding="utf-8"?>
+<p:sld xmlns:a="http://schemas.openxmlformats.org/drawingml/2006/main" xmlns:r="http://schemas.openxmlformats.org/officeDocument/2006/relationships" xmlns:p="http://schemas.openxmlformats.org/presentationml/2006/main" show="0">
+  <p:cSld>
+    <p:spTree>
+      <p:nvGrpSpPr>
+        <p:cNvPr id="1" name=""/>
+        <p:cNvGrpSpPr/>
+        <p:nvPr/>
+      </p:nvGrpSpPr>
+      <p:grpSpPr>
+        <a:xfrm>
+          <a:off x="0" y="0"/>
+          <a:ext cx="0" cy="0"/>
+          <a:chOff x="0" y="0"/>
+          <a:chExt cx="0" cy="0"/>
+        </a:xfrm>
+      </p:grpSpPr>
+      <p:sp>
+        <p:nvSpPr>
+          <p:cNvPr id="3" name="Text Placeholder 2"/>
+          <p:cNvSpPr>
+            <a:spLocks noGrp="1"/>
+          </p:cNvSpPr>
+          <p:nvPr>
+            <p:ph idx="1"/>
+          </p:nvPr>
+        </p:nvSpPr>
+        <p:spPr/>
+        <p:txBody>
+          <a:bodyPr/>
+          <a:lstStyle/>
+          <a:p>
+            <a:r>
+              <a:rPr lang="en-US" dirty="0" smtClean="0"/>
+              <a:t>Key development tasks are translation of sections of NFIRS Casualty form to FHIR standard</a:t>
+            </a:r>
+          </a:p>
+          <a:p>
+            <a:r>
+              <a:rPr lang="en-US" dirty="0" smtClean="0"/>
+              <a:t>QA follows behind translation, ensuring correctness</a:t>
+            </a:r>
+          </a:p>
+          <a:p>
+            <a:r>
+              <a:rPr lang="en-US" dirty="0" smtClean="0"/>
+              <a:t>Final deliverable is implementation guide</a:t>
+            </a:r>
+          </a:p>
+          <a:p>
+            <a:endParaRPr lang="en-US" dirty="0" smtClean="0"/>
+          </a:p>
+          <a:p>
+            <a:endParaRPr lang="en-US" dirty="0"/>
+          </a:p>
+        </p:txBody>
+      </p:sp>
+      <p:sp>
+        <p:nvSpPr>
+          <p:cNvPr id="6" name="Date Placeholder 5"/>
+          <p:cNvSpPr>
+            <a:spLocks noGrp="1"/>
+          </p:cNvSpPr>
+          <p:nvPr>
+            <p:ph type="dt" sz="half" idx="10"/>
+          </p:nvPr>
+        </p:nvSpPr>
+        <p:spPr/>
+        <p:txBody>
+          <a:bodyPr/>
+          <a:lstStyle/>
+          <a:p>
+            <a:r>
+              <a:rPr lang="en-US" dirty="0" smtClean="0"/>
+              <a:t>9/20/2020</a:t>
+            </a:r>
+            <a:endParaRPr lang="en-US" dirty="0"/>
+          </a:p>
+        </p:txBody>
+      </p:sp>
+      <p:sp>
+        <p:nvSpPr>
+          <p:cNvPr id="5" name="Slide Number Placeholder 4"/>
+          <p:cNvSpPr>
+            <a:spLocks noGrp="1"/>
+          </p:cNvSpPr>
+          <p:nvPr>
+            <p:ph type="sldNum" sz="quarter" idx="12"/>
+          </p:nvPr>
+        </p:nvSpPr>
+        <p:spPr/>
+        <p:txBody>
+          <a:bodyPr/>
+          <a:lstStyle/>
+          <a:p>
+            <a:fld id="{079BB85F-8D7B-4121-93BF-56CC81854BC2}" type="slidenum">
+              <a:rPr lang="en-US" smtClean="0"/>
+              <a:pPr/>
+              <a:t>9</a:t>
+            </a:fld>
+            <a:endParaRPr lang="en-US" dirty="0"/>
+          </a:p>
+        </p:txBody>
+      </p:sp>
+      <p:sp>
+        <p:nvSpPr>
+          <p:cNvPr id="2" name="Title 1"/>
+          <p:cNvSpPr>
+            <a:spLocks noGrp="1"/>
+          </p:cNvSpPr>
+          <p:nvPr>
+            <p:ph type="title"/>
+          </p:nvPr>
+        </p:nvSpPr>
+        <p:spPr/>
+        <p:txBody>
+          <a:bodyPr/>
+          <a:lstStyle/>
+          <a:p>
+            <a:r>
+              <a:rPr lang="en-US" dirty="0" smtClean="0"/>
+              <a:t>Project Plan</a:t>
+            </a:r>
+            <a:endParaRPr lang="en-US" dirty="0"/>
+          </a:p>
+        </p:txBody>
+      </p:sp>
+      <p:pic>
+        <p:nvPicPr>
+          <p:cNvPr id="3074" name="Picture 2"/>
+          <p:cNvPicPr>
+            <a:picLocks noChangeAspect="1" noChangeArrowheads="1"/>
+          </p:cNvPicPr>
+          <p:nvPr/>
+        </p:nvPicPr>
+        <p:blipFill>
+          <a:blip r:embed="rId2">
+            <a:extLst>
+              <a:ext uri="{28A0092B-C50C-407E-A947-70E740481C1C}">
+                <a14:useLocalDpi xmlns:a14="http://schemas.microsoft.com/office/drawing/2010/main" val="0"/>
+              </a:ext>
+            </a:extLst>
+          </a:blip>
+          <a:srcRect/>
+          <a:stretch>
+            <a:fillRect/>
+          </a:stretch>
+        </p:blipFill>
+        <p:spPr bwMode="auto">
+          <a:xfrm>
+            <a:off x="466056" y="3442900"/>
+            <a:ext cx="8220744" cy="1281500"/>
+          </a:xfrm>
+          <a:prstGeom prst="rect">
+            <a:avLst/>
+          </a:prstGeom>
+          <a:noFill/>
+          <a:ln>
+            <a:noFill/>
+          </a:ln>
+          <a:effectLst/>
+          <a:extLst>
+            <a:ext uri="{909E8E84-426E-40DD-AFC4-6F175D3DCCD1}">
+              <a14:hiddenFill xmlns:a14="http://schemas.microsoft.com/office/drawing/2010/main">
+                <a:solidFill>
+                  <a:schemeClr val="accent1"/>
+                </a:solidFill>
+              </a14:hiddenFill>
+            </a:ext>
+            <a:ext uri="{91240B29-F687-4F45-9708-019B960494DF}">
+              <a14:hiddenLine xmlns:a14="http://schemas.microsoft.com/office/drawing/2010/main" w="9525">
+                <a:solidFill>
+                  <a:schemeClr val="tx1"/>
+                </a:solidFill>
+                <a:miter lim="800000"/>
+                <a:headEnd/>
+                <a:tailEnd/>
+              </a14:hiddenLine>
+            </a:ext>
+            <a:ext uri="{AF507438-7753-43E0-B8FC-AC1667EBCBE1}">
+              <a14:hiddenEffects xmlns:a14="http://schemas.microsoft.com/office/drawing/2010/main">
+                <a:effectLst>
+                  <a:outerShdw dist="35921" dir="2700000" algn="ctr" rotWithShape="0">
+                    <a:schemeClr val="bg2"/>
+                  </a:outerShdw>
+                </a:effectLst>
+              </a14:hiddenEffects>
+            </a:ext>
+          </a:extLst>
+        </p:spPr>
+      </p:pic>
+    </p:spTree>
+    <p:extLst>
+      <p:ext uri="{BB962C8B-B14F-4D97-AF65-F5344CB8AC3E}">
+        <p14:creationId xmlns:p14="http://schemas.microsoft.com/office/powerpoint/2010/main" val="1743519783"/>
+      </p:ext>
+    </p:extLst>
+  </p:cSld>
+  <p:clrMapOvr>
+    <a:masterClrMapping/>
+  </p:clrMapOvr>
+  <mc:AlternateContent xmlns:mc="http://schemas.openxmlformats.org/markup-compatibility/2006">
+    <mc:Choice xmlns:p14="http://schemas.microsoft.com/office/powerpoint/2010/main" Requires="p14">
+      <p:transition spd="slow" p14:dur="2000"/>
+    </mc:Choice>
+    <mc:Fallback>
+      <p:transition spd="slow"/>
+    </mc:Fallback>
+  </mc:AlternateContent>
+  <p:timing>
+    <p:tnLst>
+      <p:par>
+        <p:cTn id="1" dur="indefinite" restart="never" nodeType="tmRoot"/>
+      </p:par>
+    </p:tnLst>
+  </p:timing>
 </p:sld>
 </file>
 

</xml_diff>

<commit_message>
Update per scope change
</commit_message>
<xml_diff>
--- a/Team 55 Project Plan.pptx
+++ b/Team 55 Project Plan.pptx
@@ -6,7 +6,7 @@
     <p:sldMasterId id="2147483680" r:id="rId2"/>
   </p:sldMasterIdLst>
   <p:notesMasterIdLst>
-    <p:notesMasterId r:id="rId15"/>
+    <p:notesMasterId r:id="rId10"/>
   </p:notesMasterIdLst>
   <p:sldIdLst>
     <p:sldId id="265" r:id="rId3"/>
@@ -16,11 +16,6 @@
     <p:sldId id="264" r:id="rId7"/>
     <p:sldId id="263" r:id="rId8"/>
     <p:sldId id="270" r:id="rId9"/>
-    <p:sldId id="271" r:id="rId10"/>
-    <p:sldId id="259" r:id="rId11"/>
-    <p:sldId id="267" r:id="rId12"/>
-    <p:sldId id="268" r:id="rId13"/>
-    <p:sldId id="269" r:id="rId14"/>
   </p:sldIdLst>
   <p:sldSz cx="9144000" cy="6858000" type="screen4x3"/>
   <p:notesSz cx="6858000" cy="9144000"/>
@@ -4207,7 +4202,11 @@
           <a:p>
             <a:r>
               <a:rPr lang="en-US" dirty="0" smtClean="0"/>
-              <a:t>A CDC-NIOSH Project</a:t>
+              <a:t>In Collaboration with </a:t>
+            </a:r>
+            <a:r>
+              <a:rPr lang="en-US" dirty="0" smtClean="0"/>
+              <a:t>CDC-NIOSH</a:t>
             </a:r>
             <a:endParaRPr lang="en-US" dirty="0"/>
           </a:p>
@@ -4230,491 +4229,6 @@
   <p:clrMapOvr>
     <a:masterClrMapping/>
   </p:clrMapOvr>
-</p:sld>
-</file>
-
-<file path=ppt/slides/slide10.xml><?xml version="1.0" encoding="utf-8"?>
-<p:sld xmlns:a="http://schemas.openxmlformats.org/drawingml/2006/main" xmlns:r="http://schemas.openxmlformats.org/officeDocument/2006/relationships" xmlns:p="http://schemas.openxmlformats.org/presentationml/2006/main" show="0">
-  <p:cSld>
-    <p:spTree>
-      <p:nvGrpSpPr>
-        <p:cNvPr id="1" name=""/>
-        <p:cNvGrpSpPr/>
-        <p:nvPr/>
-      </p:nvGrpSpPr>
-      <p:grpSpPr>
-        <a:xfrm>
-          <a:off x="0" y="0"/>
-          <a:ext cx="0" cy="0"/>
-          <a:chOff x="0" y="0"/>
-          <a:chExt cx="0" cy="0"/>
-        </a:xfrm>
-      </p:grpSpPr>
-      <p:sp>
-        <p:nvSpPr>
-          <p:cNvPr id="6" name="Date Placeholder 5"/>
-          <p:cNvSpPr>
-            <a:spLocks noGrp="1"/>
-          </p:cNvSpPr>
-          <p:nvPr>
-            <p:ph type="dt" sz="half" idx="10"/>
-          </p:nvPr>
-        </p:nvSpPr>
-        <p:spPr/>
-        <p:txBody>
-          <a:bodyPr/>
-          <a:lstStyle/>
-          <a:p>
-            <a:r>
-              <a:rPr lang="en-US" dirty="0" smtClean="0"/>
-              <a:t>9/20/2020</a:t>
-            </a:r>
-            <a:endParaRPr lang="en-US" dirty="0"/>
-          </a:p>
-        </p:txBody>
-      </p:sp>
-      <p:sp>
-        <p:nvSpPr>
-          <p:cNvPr id="5" name="Slide Number Placeholder 4"/>
-          <p:cNvSpPr>
-            <a:spLocks noGrp="1"/>
-          </p:cNvSpPr>
-          <p:nvPr>
-            <p:ph type="sldNum" sz="quarter" idx="12"/>
-          </p:nvPr>
-        </p:nvSpPr>
-        <p:spPr/>
-        <p:txBody>
-          <a:bodyPr/>
-          <a:lstStyle/>
-          <a:p>
-            <a:fld id="{079BB85F-8D7B-4121-93BF-56CC81854BC2}" type="slidenum">
-              <a:rPr lang="en-US" smtClean="0"/>
-              <a:pPr/>
-              <a:t>10</a:t>
-            </a:fld>
-            <a:endParaRPr lang="en-US" dirty="0"/>
-          </a:p>
-        </p:txBody>
-      </p:sp>
-      <p:sp>
-        <p:nvSpPr>
-          <p:cNvPr id="2" name="Title 1"/>
-          <p:cNvSpPr>
-            <a:spLocks noGrp="1"/>
-          </p:cNvSpPr>
-          <p:nvPr>
-            <p:ph type="title"/>
-          </p:nvPr>
-        </p:nvSpPr>
-        <p:spPr/>
-        <p:txBody>
-          <a:bodyPr/>
-          <a:lstStyle/>
-          <a:p>
-            <a:r>
-              <a:rPr lang="en-US" dirty="0" smtClean="0"/>
-              <a:t>Project Plan</a:t>
-            </a:r>
-            <a:endParaRPr lang="en-US" dirty="0"/>
-          </a:p>
-        </p:txBody>
-      </p:sp>
-      <p:pic>
-        <p:nvPicPr>
-          <p:cNvPr id="5123" name="Picture 3"/>
-          <p:cNvPicPr>
-            <a:picLocks noChangeAspect="1" noChangeArrowheads="1"/>
-          </p:cNvPicPr>
-          <p:nvPr/>
-        </p:nvPicPr>
-        <p:blipFill>
-          <a:blip r:embed="rId2">
-            <a:extLst>
-              <a:ext uri="{28A0092B-C50C-407E-A947-70E740481C1C}">
-                <a14:useLocalDpi xmlns:a14="http://schemas.microsoft.com/office/drawing/2010/main" val="0"/>
-              </a:ext>
-            </a:extLst>
-          </a:blip>
-          <a:srcRect/>
-          <a:stretch>
-            <a:fillRect/>
-          </a:stretch>
-        </p:blipFill>
-        <p:spPr bwMode="auto">
-          <a:xfrm>
-            <a:off x="244436" y="2109787"/>
-            <a:ext cx="8823364" cy="2690813"/>
-          </a:xfrm>
-          <a:prstGeom prst="rect">
-            <a:avLst/>
-          </a:prstGeom>
-          <a:noFill/>
-          <a:ln>
-            <a:noFill/>
-          </a:ln>
-          <a:effectLst/>
-          <a:extLst>
-            <a:ext uri="{909E8E84-426E-40DD-AFC4-6F175D3DCCD1}">
-              <a14:hiddenFill xmlns:a14="http://schemas.microsoft.com/office/drawing/2010/main">
-                <a:solidFill>
-                  <a:schemeClr val="accent1"/>
-                </a:solidFill>
-              </a14:hiddenFill>
-            </a:ext>
-            <a:ext uri="{91240B29-F687-4F45-9708-019B960494DF}">
-              <a14:hiddenLine xmlns:a14="http://schemas.microsoft.com/office/drawing/2010/main" w="9525">
-                <a:solidFill>
-                  <a:schemeClr val="tx1"/>
-                </a:solidFill>
-                <a:miter lim="800000"/>
-                <a:headEnd/>
-                <a:tailEnd/>
-              </a14:hiddenLine>
-            </a:ext>
-            <a:ext uri="{AF507438-7753-43E0-B8FC-AC1667EBCBE1}">
-              <a14:hiddenEffects xmlns:a14="http://schemas.microsoft.com/office/drawing/2010/main">
-                <a:effectLst>
-                  <a:outerShdw dist="35921" dir="2700000" algn="ctr" rotWithShape="0">
-                    <a:schemeClr val="bg2"/>
-                  </a:outerShdw>
-                </a:effectLst>
-              </a14:hiddenEffects>
-            </a:ext>
-          </a:extLst>
-        </p:spPr>
-      </p:pic>
-    </p:spTree>
-    <p:extLst>
-      <p:ext uri="{BB962C8B-B14F-4D97-AF65-F5344CB8AC3E}">
-        <p14:creationId xmlns:p14="http://schemas.microsoft.com/office/powerpoint/2010/main" val="3284966928"/>
-      </p:ext>
-    </p:extLst>
-  </p:cSld>
-  <p:clrMapOvr>
-    <a:masterClrMapping/>
-  </p:clrMapOvr>
-  <mc:AlternateContent xmlns:mc="http://schemas.openxmlformats.org/markup-compatibility/2006">
-    <mc:Choice xmlns:p14="http://schemas.microsoft.com/office/powerpoint/2010/main" Requires="p14">
-      <p:transition spd="slow" p14:dur="2000"/>
-    </mc:Choice>
-    <mc:Fallback>
-      <p:transition spd="slow"/>
-    </mc:Fallback>
-  </mc:AlternateContent>
-  <p:timing>
-    <p:tnLst>
-      <p:par>
-        <p:cTn id="1" dur="indefinite" restart="never" nodeType="tmRoot"/>
-      </p:par>
-    </p:tnLst>
-  </p:timing>
-</p:sld>
-</file>
-
-<file path=ppt/slides/slide11.xml><?xml version="1.0" encoding="utf-8"?>
-<p:sld xmlns:a="http://schemas.openxmlformats.org/drawingml/2006/main" xmlns:r="http://schemas.openxmlformats.org/officeDocument/2006/relationships" xmlns:p="http://schemas.openxmlformats.org/presentationml/2006/main" show="0">
-  <p:cSld>
-    <p:spTree>
-      <p:nvGrpSpPr>
-        <p:cNvPr id="1" name=""/>
-        <p:cNvGrpSpPr/>
-        <p:nvPr/>
-      </p:nvGrpSpPr>
-      <p:grpSpPr>
-        <a:xfrm>
-          <a:off x="0" y="0"/>
-          <a:ext cx="0" cy="0"/>
-          <a:chOff x="0" y="0"/>
-          <a:chExt cx="0" cy="0"/>
-        </a:xfrm>
-      </p:grpSpPr>
-      <p:sp>
-        <p:nvSpPr>
-          <p:cNvPr id="6" name="Date Placeholder 5"/>
-          <p:cNvSpPr>
-            <a:spLocks noGrp="1"/>
-          </p:cNvSpPr>
-          <p:nvPr>
-            <p:ph type="dt" sz="half" idx="10"/>
-          </p:nvPr>
-        </p:nvSpPr>
-        <p:spPr/>
-        <p:txBody>
-          <a:bodyPr/>
-          <a:lstStyle/>
-          <a:p>
-            <a:r>
-              <a:rPr lang="en-US" dirty="0" smtClean="0"/>
-              <a:t>9/20/2020</a:t>
-            </a:r>
-            <a:endParaRPr lang="en-US" dirty="0"/>
-          </a:p>
-        </p:txBody>
-      </p:sp>
-      <p:sp>
-        <p:nvSpPr>
-          <p:cNvPr id="5" name="Slide Number Placeholder 4"/>
-          <p:cNvSpPr>
-            <a:spLocks noGrp="1"/>
-          </p:cNvSpPr>
-          <p:nvPr>
-            <p:ph type="sldNum" sz="quarter" idx="12"/>
-          </p:nvPr>
-        </p:nvSpPr>
-        <p:spPr/>
-        <p:txBody>
-          <a:bodyPr/>
-          <a:lstStyle/>
-          <a:p>
-            <a:fld id="{079BB85F-8D7B-4121-93BF-56CC81854BC2}" type="slidenum">
-              <a:rPr lang="en-US" smtClean="0"/>
-              <a:pPr/>
-              <a:t>11</a:t>
-            </a:fld>
-            <a:endParaRPr lang="en-US" dirty="0"/>
-          </a:p>
-        </p:txBody>
-      </p:sp>
-      <p:sp>
-        <p:nvSpPr>
-          <p:cNvPr id="2" name="Title 1"/>
-          <p:cNvSpPr>
-            <a:spLocks noGrp="1"/>
-          </p:cNvSpPr>
-          <p:nvPr>
-            <p:ph type="title"/>
-          </p:nvPr>
-        </p:nvSpPr>
-        <p:spPr/>
-        <p:txBody>
-          <a:bodyPr/>
-          <a:lstStyle/>
-          <a:p>
-            <a:r>
-              <a:rPr lang="en-US" dirty="0" smtClean="0"/>
-              <a:t>Project Plan</a:t>
-            </a:r>
-            <a:endParaRPr lang="en-US" dirty="0"/>
-          </a:p>
-        </p:txBody>
-      </p:sp>
-      <p:pic>
-        <p:nvPicPr>
-          <p:cNvPr id="5123" name="Picture 3"/>
-          <p:cNvPicPr>
-            <a:picLocks noChangeAspect="1" noChangeArrowheads="1"/>
-          </p:cNvPicPr>
-          <p:nvPr/>
-        </p:nvPicPr>
-        <p:blipFill>
-          <a:blip r:embed="rId2">
-            <a:extLst>
-              <a:ext uri="{28A0092B-C50C-407E-A947-70E740481C1C}">
-                <a14:useLocalDpi xmlns:a14="http://schemas.microsoft.com/office/drawing/2010/main" val="0"/>
-              </a:ext>
-            </a:extLst>
-          </a:blip>
-          <a:srcRect/>
-          <a:stretch>
-            <a:fillRect/>
-          </a:stretch>
-        </p:blipFill>
-        <p:spPr bwMode="auto">
-          <a:xfrm>
-            <a:off x="244436" y="2109787"/>
-            <a:ext cx="8823364" cy="2690813"/>
-          </a:xfrm>
-          <a:prstGeom prst="rect">
-            <a:avLst/>
-          </a:prstGeom>
-          <a:noFill/>
-          <a:ln>
-            <a:noFill/>
-          </a:ln>
-          <a:effectLst/>
-          <a:extLst>
-            <a:ext uri="{909E8E84-426E-40DD-AFC4-6F175D3DCCD1}">
-              <a14:hiddenFill xmlns:a14="http://schemas.microsoft.com/office/drawing/2010/main">
-                <a:solidFill>
-                  <a:schemeClr val="accent1"/>
-                </a:solidFill>
-              </a14:hiddenFill>
-            </a:ext>
-            <a:ext uri="{91240B29-F687-4F45-9708-019B960494DF}">
-              <a14:hiddenLine xmlns:a14="http://schemas.microsoft.com/office/drawing/2010/main" w="9525">
-                <a:solidFill>
-                  <a:schemeClr val="tx1"/>
-                </a:solidFill>
-                <a:miter lim="800000"/>
-                <a:headEnd/>
-                <a:tailEnd/>
-              </a14:hiddenLine>
-            </a:ext>
-            <a:ext uri="{AF507438-7753-43E0-B8FC-AC1667EBCBE1}">
-              <a14:hiddenEffects xmlns:a14="http://schemas.microsoft.com/office/drawing/2010/main">
-                <a:effectLst>
-                  <a:outerShdw dist="35921" dir="2700000" algn="ctr" rotWithShape="0">
-                    <a:schemeClr val="bg2"/>
-                  </a:outerShdw>
-                </a:effectLst>
-              </a14:hiddenEffects>
-            </a:ext>
-          </a:extLst>
-        </p:spPr>
-      </p:pic>
-    </p:spTree>
-    <p:extLst>
-      <p:ext uri="{BB962C8B-B14F-4D97-AF65-F5344CB8AC3E}">
-        <p14:creationId xmlns:p14="http://schemas.microsoft.com/office/powerpoint/2010/main" val="2299931227"/>
-      </p:ext>
-    </p:extLst>
-  </p:cSld>
-  <p:clrMapOvr>
-    <a:masterClrMapping/>
-  </p:clrMapOvr>
-  <mc:AlternateContent xmlns:mc="http://schemas.openxmlformats.org/markup-compatibility/2006">
-    <mc:Choice xmlns:p14="http://schemas.microsoft.com/office/powerpoint/2010/main" Requires="p14">
-      <p:transition spd="slow" p14:dur="2000"/>
-    </mc:Choice>
-    <mc:Fallback>
-      <p:transition spd="slow"/>
-    </mc:Fallback>
-  </mc:AlternateContent>
-  <p:timing>
-    <p:tnLst>
-      <p:par>
-        <p:cTn id="1" dur="indefinite" restart="never" nodeType="tmRoot"/>
-      </p:par>
-    </p:tnLst>
-  </p:timing>
-</p:sld>
-</file>
-
-<file path=ppt/slides/slide12.xml><?xml version="1.0" encoding="utf-8"?>
-<p:sld xmlns:a="http://schemas.openxmlformats.org/drawingml/2006/main" xmlns:r="http://schemas.openxmlformats.org/officeDocument/2006/relationships" xmlns:p="http://schemas.openxmlformats.org/presentationml/2006/main" show="0">
-  <p:cSld>
-    <p:spTree>
-      <p:nvGrpSpPr>
-        <p:cNvPr id="1" name=""/>
-        <p:cNvGrpSpPr/>
-        <p:nvPr/>
-      </p:nvGrpSpPr>
-      <p:grpSpPr>
-        <a:xfrm>
-          <a:off x="0" y="0"/>
-          <a:ext cx="0" cy="0"/>
-          <a:chOff x="0" y="0"/>
-          <a:chExt cx="0" cy="0"/>
-        </a:xfrm>
-      </p:grpSpPr>
-      <p:sp>
-        <p:nvSpPr>
-          <p:cNvPr id="2" name="Title 1"/>
-          <p:cNvSpPr>
-            <a:spLocks noGrp="1"/>
-          </p:cNvSpPr>
-          <p:nvPr>
-            <p:ph type="title"/>
-          </p:nvPr>
-        </p:nvSpPr>
-        <p:spPr/>
-        <p:txBody>
-          <a:bodyPr>
-            <a:normAutofit/>
-          </a:bodyPr>
-          <a:lstStyle/>
-          <a:p>
-            <a:r>
-              <a:rPr lang="en-US" smtClean="0"/>
-              <a:t>Project Plan</a:t>
-            </a:r>
-            <a:endParaRPr lang="en-US" dirty="0"/>
-          </a:p>
-        </p:txBody>
-      </p:sp>
-      <p:pic>
-        <p:nvPicPr>
-          <p:cNvPr id="6146" name="Picture 2"/>
-          <p:cNvPicPr>
-            <a:picLocks noChangeAspect="1" noChangeArrowheads="1"/>
-          </p:cNvPicPr>
-          <p:nvPr/>
-        </p:nvPicPr>
-        <p:blipFill>
-          <a:blip r:embed="rId2">
-            <a:extLst>
-              <a:ext uri="{28A0092B-C50C-407E-A947-70E740481C1C}">
-                <a14:useLocalDpi xmlns:a14="http://schemas.microsoft.com/office/drawing/2010/main" val="0"/>
-              </a:ext>
-            </a:extLst>
-          </a:blip>
-          <a:srcRect/>
-          <a:stretch>
-            <a:fillRect/>
-          </a:stretch>
-        </p:blipFill>
-        <p:spPr bwMode="auto">
-          <a:xfrm>
-            <a:off x="588461" y="1219200"/>
-            <a:ext cx="8098339" cy="4500563"/>
-          </a:xfrm>
-          <a:prstGeom prst="rect">
-            <a:avLst/>
-          </a:prstGeom>
-          <a:noFill/>
-          <a:ln>
-            <a:noFill/>
-          </a:ln>
-          <a:effectLst/>
-          <a:extLst>
-            <a:ext uri="{909E8E84-426E-40DD-AFC4-6F175D3DCCD1}">
-              <a14:hiddenFill xmlns:a14="http://schemas.microsoft.com/office/drawing/2010/main">
-                <a:solidFill>
-                  <a:schemeClr val="accent1"/>
-                </a:solidFill>
-              </a14:hiddenFill>
-            </a:ext>
-            <a:ext uri="{91240B29-F687-4F45-9708-019B960494DF}">
-              <a14:hiddenLine xmlns:a14="http://schemas.microsoft.com/office/drawing/2010/main" w="9525">
-                <a:solidFill>
-                  <a:schemeClr val="tx1"/>
-                </a:solidFill>
-                <a:miter lim="800000"/>
-                <a:headEnd/>
-                <a:tailEnd/>
-              </a14:hiddenLine>
-            </a:ext>
-            <a:ext uri="{AF507438-7753-43E0-B8FC-AC1667EBCBE1}">
-              <a14:hiddenEffects xmlns:a14="http://schemas.microsoft.com/office/drawing/2010/main">
-                <a:effectLst>
-                  <a:outerShdw dist="35921" dir="2700000" algn="ctr" rotWithShape="0">
-                    <a:schemeClr val="bg2"/>
-                  </a:outerShdw>
-                </a:effectLst>
-              </a14:hiddenEffects>
-            </a:ext>
-          </a:extLst>
-        </p:spPr>
-      </p:pic>
-    </p:spTree>
-    <p:extLst>
-      <p:ext uri="{BB962C8B-B14F-4D97-AF65-F5344CB8AC3E}">
-        <p14:creationId xmlns:p14="http://schemas.microsoft.com/office/powerpoint/2010/main" val="192466914"/>
-      </p:ext>
-    </p:extLst>
-  </p:cSld>
-  <p:clrMapOvr>
-    <a:masterClrMapping/>
-  </p:clrMapOvr>
-  <mc:AlternateContent xmlns:mc="http://schemas.openxmlformats.org/markup-compatibility/2006">
-    <mc:Choice xmlns:p14="http://schemas.microsoft.com/office/powerpoint/2010/main" Requires="p14">
-      <p:transition spd="slow" p14:dur="2000"/>
-    </mc:Choice>
-    <mc:Fallback>
-      <p:transition spd="slow"/>
-    </mc:Fallback>
-  </mc:AlternateContent>
 </p:sld>
 </file>
 
@@ -4752,13 +4266,13 @@
           <a:p>
             <a:r>
               <a:rPr lang="en-US" dirty="0" smtClean="0"/>
-              <a:t>Introduction and Background</a:t>
+              <a:t>Motivation Behind the National Firefighter Registry</a:t>
             </a:r>
           </a:p>
           <a:p>
             <a:r>
               <a:rPr lang="en-US" dirty="0" smtClean="0"/>
-              <a:t>Scope of National Fire Registry</a:t>
+              <a:t>Scope of National Firefighter Registry</a:t>
             </a:r>
           </a:p>
           <a:p>
@@ -5320,8 +4834,17 @@
           <a:p>
             <a:r>
               <a:rPr lang="en-US" dirty="0" smtClean="0"/>
-              <a:t>Goal: create FHIR implementation guide (IG) for NFIRS casualty form </a:t>
-            </a:r>
+              <a:t>Goal: Accept JSON/XML FHIR resources, validate, and insert into SQL database</a:t>
+            </a:r>
+          </a:p>
+          <a:p>
+            <a:r>
+              <a:rPr lang="en-US" dirty="0" smtClean="0"/>
+              <a:t>Add visualization capabilities to SQL database</a:t>
+            </a:r>
+          </a:p>
+          <a:p>
+            <a:endParaRPr lang="en-US" dirty="0" smtClean="0"/>
           </a:p>
         </p:txBody>
       </p:sp>
@@ -5494,38 +5017,6 @@
       </p:grpSpPr>
       <p:sp>
         <p:nvSpPr>
-          <p:cNvPr id="3" name="Text Placeholder 2"/>
-          <p:cNvSpPr>
-            <a:spLocks noGrp="1"/>
-          </p:cNvSpPr>
-          <p:nvPr>
-            <p:ph idx="1"/>
-          </p:nvPr>
-        </p:nvSpPr>
-        <p:spPr/>
-        <p:txBody>
-          <a:bodyPr>
-            <a:normAutofit/>
-          </a:bodyPr>
-          <a:lstStyle/>
-          <a:p>
-            <a:r>
-              <a:rPr lang="en-US" dirty="0" smtClean="0"/>
-              <a:t>Plan: Use </a:t>
-            </a:r>
-            <a:r>
-              <a:rPr lang="en-US" dirty="0" err="1" smtClean="0"/>
-              <a:t>Trifolia</a:t>
-            </a:r>
-            <a:r>
-              <a:rPr lang="en-US" dirty="0" smtClean="0"/>
-              <a:t>-on-FHIR for IG Creation</a:t>
-            </a:r>
-          </a:p>
-        </p:txBody>
-      </p:sp>
-      <p:sp>
-        <p:nvSpPr>
           <p:cNvPr id="6" name="Date Placeholder 5"/>
           <p:cNvSpPr>
             <a:spLocks noGrp="1"/>
@@ -5596,7 +5087,7 @@
       </p:sp>
       <p:pic>
         <p:nvPicPr>
-          <p:cNvPr id="2050" name="Picture 2" descr="https://github.gatech.edu/raw/gt-cs6440-hit-fall2020/National-Firefighter-Registry/master/Architectural_Diagram.PNG?token=AAAEHKUU5Z5UK5X5UI6FQCK7OEYB6"/>
+          <p:cNvPr id="2052" name="Picture 4" descr="https://github.gatech.edu/raw/gt-cs6440-hit-fall2020/National-Firefighter-Registry/master/Architectural_Diagram.PNG?token=AAAEHKTRXRXTP76KWMLOP6K7OKING"/>
           <p:cNvPicPr>
             <a:picLocks noChangeAspect="1" noChangeArrowheads="1"/>
           </p:cNvPicPr>
@@ -5617,8 +5108,8 @@
         </p:blipFill>
         <p:spPr bwMode="auto">
           <a:xfrm>
-            <a:off x="914400" y="2083175"/>
-            <a:ext cx="7315200" cy="3860425"/>
+            <a:off x="914400" y="1066800"/>
+            <a:ext cx="7239000" cy="4713375"/>
           </a:xfrm>
           <a:prstGeom prst="rect">
             <a:avLst/>
@@ -5699,7 +5190,7 @@
       </p:sp>
       <p:pic>
         <p:nvPicPr>
-          <p:cNvPr id="7170" name="Picture 2"/>
+          <p:cNvPr id="7172" name="Picture 4"/>
           <p:cNvPicPr>
             <a:picLocks noChangeAspect="1" noChangeArrowheads="1"/>
           </p:cNvPicPr>
@@ -5720,8 +5211,8 @@
         </p:blipFill>
         <p:spPr bwMode="auto">
           <a:xfrm>
-            <a:off x="457200" y="1211901"/>
-            <a:ext cx="8305800" cy="4807899"/>
+            <a:off x="685800" y="1219200"/>
+            <a:ext cx="7796213" cy="4535866"/>
           </a:xfrm>
           <a:prstGeom prst="rect">
             <a:avLst/>
@@ -5771,288 +5262,6 @@
   <p:clrMapOvr>
     <a:masterClrMapping/>
   </p:clrMapOvr>
-</p:sld>
-</file>
-
-<file path=ppt/slides/slide8.xml><?xml version="1.0" encoding="utf-8"?>
-<p:sld xmlns:a="http://schemas.openxmlformats.org/drawingml/2006/main" xmlns:r="http://schemas.openxmlformats.org/officeDocument/2006/relationships" xmlns:p="http://schemas.openxmlformats.org/presentationml/2006/main" show="0">
-  <p:cSld>
-    <p:spTree>
-      <p:nvGrpSpPr>
-        <p:cNvPr id="1" name=""/>
-        <p:cNvGrpSpPr/>
-        <p:nvPr/>
-      </p:nvGrpSpPr>
-      <p:grpSpPr>
-        <a:xfrm>
-          <a:off x="0" y="0"/>
-          <a:ext cx="0" cy="0"/>
-          <a:chOff x="0" y="0"/>
-          <a:chExt cx="0" cy="0"/>
-        </a:xfrm>
-      </p:grpSpPr>
-      <p:sp>
-        <p:nvSpPr>
-          <p:cNvPr id="5" name="Title 4"/>
-          <p:cNvSpPr>
-            <a:spLocks noGrp="1"/>
-          </p:cNvSpPr>
-          <p:nvPr>
-            <p:ph type="title"/>
-          </p:nvPr>
-        </p:nvSpPr>
-        <p:spPr/>
-        <p:txBody>
-          <a:bodyPr>
-            <a:normAutofit/>
-          </a:bodyPr>
-          <a:lstStyle/>
-          <a:p>
-            <a:r>
-              <a:rPr lang="en-US" dirty="0" smtClean="0"/>
-              <a:t>Backup</a:t>
-            </a:r>
-            <a:endParaRPr lang="en-US" dirty="0"/>
-          </a:p>
-        </p:txBody>
-      </p:sp>
-    </p:spTree>
-    <p:extLst>
-      <p:ext uri="{BB962C8B-B14F-4D97-AF65-F5344CB8AC3E}">
-        <p14:creationId xmlns:p14="http://schemas.microsoft.com/office/powerpoint/2010/main" val="1882637641"/>
-      </p:ext>
-    </p:extLst>
-  </p:cSld>
-  <p:clrMapOvr>
-    <a:masterClrMapping/>
-  </p:clrMapOvr>
-  <mc:AlternateContent xmlns:mc="http://schemas.openxmlformats.org/markup-compatibility/2006">
-    <mc:Choice xmlns:p14="http://schemas.microsoft.com/office/powerpoint/2010/main" Requires="p14">
-      <p:transition spd="slow" p14:dur="2000"/>
-    </mc:Choice>
-    <mc:Fallback>
-      <p:transition spd="slow"/>
-    </mc:Fallback>
-  </mc:AlternateContent>
-</p:sld>
-</file>
-
-<file path=ppt/slides/slide9.xml><?xml version="1.0" encoding="utf-8"?>
-<p:sld xmlns:a="http://schemas.openxmlformats.org/drawingml/2006/main" xmlns:r="http://schemas.openxmlformats.org/officeDocument/2006/relationships" xmlns:p="http://schemas.openxmlformats.org/presentationml/2006/main" show="0">
-  <p:cSld>
-    <p:spTree>
-      <p:nvGrpSpPr>
-        <p:cNvPr id="1" name=""/>
-        <p:cNvGrpSpPr/>
-        <p:nvPr/>
-      </p:nvGrpSpPr>
-      <p:grpSpPr>
-        <a:xfrm>
-          <a:off x="0" y="0"/>
-          <a:ext cx="0" cy="0"/>
-          <a:chOff x="0" y="0"/>
-          <a:chExt cx="0" cy="0"/>
-        </a:xfrm>
-      </p:grpSpPr>
-      <p:sp>
-        <p:nvSpPr>
-          <p:cNvPr id="3" name="Text Placeholder 2"/>
-          <p:cNvSpPr>
-            <a:spLocks noGrp="1"/>
-          </p:cNvSpPr>
-          <p:nvPr>
-            <p:ph idx="1"/>
-          </p:nvPr>
-        </p:nvSpPr>
-        <p:spPr/>
-        <p:txBody>
-          <a:bodyPr/>
-          <a:lstStyle/>
-          <a:p>
-            <a:r>
-              <a:rPr lang="en-US" dirty="0" smtClean="0"/>
-              <a:t>Key development tasks are translation of sections of NFIRS Casualty form to FHIR standard</a:t>
-            </a:r>
-          </a:p>
-          <a:p>
-            <a:r>
-              <a:rPr lang="en-US" dirty="0" smtClean="0"/>
-              <a:t>QA follows behind translation, ensuring correctness</a:t>
-            </a:r>
-          </a:p>
-          <a:p>
-            <a:r>
-              <a:rPr lang="en-US" dirty="0" smtClean="0"/>
-              <a:t>Final deliverable is implementation guide</a:t>
-            </a:r>
-          </a:p>
-          <a:p>
-            <a:endParaRPr lang="en-US" dirty="0" smtClean="0"/>
-          </a:p>
-          <a:p>
-            <a:endParaRPr lang="en-US" dirty="0"/>
-          </a:p>
-        </p:txBody>
-      </p:sp>
-      <p:sp>
-        <p:nvSpPr>
-          <p:cNvPr id="6" name="Date Placeholder 5"/>
-          <p:cNvSpPr>
-            <a:spLocks noGrp="1"/>
-          </p:cNvSpPr>
-          <p:nvPr>
-            <p:ph type="dt" sz="half" idx="10"/>
-          </p:nvPr>
-        </p:nvSpPr>
-        <p:spPr/>
-        <p:txBody>
-          <a:bodyPr/>
-          <a:lstStyle/>
-          <a:p>
-            <a:r>
-              <a:rPr lang="en-US" dirty="0" smtClean="0"/>
-              <a:t>9/20/2020</a:t>
-            </a:r>
-            <a:endParaRPr lang="en-US" dirty="0"/>
-          </a:p>
-        </p:txBody>
-      </p:sp>
-      <p:sp>
-        <p:nvSpPr>
-          <p:cNvPr id="5" name="Slide Number Placeholder 4"/>
-          <p:cNvSpPr>
-            <a:spLocks noGrp="1"/>
-          </p:cNvSpPr>
-          <p:nvPr>
-            <p:ph type="sldNum" sz="quarter" idx="12"/>
-          </p:nvPr>
-        </p:nvSpPr>
-        <p:spPr/>
-        <p:txBody>
-          <a:bodyPr/>
-          <a:lstStyle/>
-          <a:p>
-            <a:fld id="{079BB85F-8D7B-4121-93BF-56CC81854BC2}" type="slidenum">
-              <a:rPr lang="en-US" smtClean="0"/>
-              <a:pPr/>
-              <a:t>9</a:t>
-            </a:fld>
-            <a:endParaRPr lang="en-US" dirty="0"/>
-          </a:p>
-        </p:txBody>
-      </p:sp>
-      <p:sp>
-        <p:nvSpPr>
-          <p:cNvPr id="2" name="Title 1"/>
-          <p:cNvSpPr>
-            <a:spLocks noGrp="1"/>
-          </p:cNvSpPr>
-          <p:nvPr>
-            <p:ph type="title"/>
-          </p:nvPr>
-        </p:nvSpPr>
-        <p:spPr/>
-        <p:txBody>
-          <a:bodyPr/>
-          <a:lstStyle/>
-          <a:p>
-            <a:r>
-              <a:rPr lang="en-US" dirty="0" smtClean="0"/>
-              <a:t>Project Plan</a:t>
-            </a:r>
-            <a:endParaRPr lang="en-US" dirty="0"/>
-          </a:p>
-        </p:txBody>
-      </p:sp>
-      <p:pic>
-        <p:nvPicPr>
-          <p:cNvPr id="3074" name="Picture 2"/>
-          <p:cNvPicPr>
-            <a:picLocks noChangeAspect="1" noChangeArrowheads="1"/>
-          </p:cNvPicPr>
-          <p:nvPr/>
-        </p:nvPicPr>
-        <p:blipFill>
-          <a:blip r:embed="rId2">
-            <a:extLst>
-              <a:ext uri="{28A0092B-C50C-407E-A947-70E740481C1C}">
-                <a14:useLocalDpi xmlns:a14="http://schemas.microsoft.com/office/drawing/2010/main" val="0"/>
-              </a:ext>
-            </a:extLst>
-          </a:blip>
-          <a:srcRect/>
-          <a:stretch>
-            <a:fillRect/>
-          </a:stretch>
-        </p:blipFill>
-        <p:spPr bwMode="auto">
-          <a:xfrm>
-            <a:off x="466056" y="3442900"/>
-            <a:ext cx="8220744" cy="1281500"/>
-          </a:xfrm>
-          <a:prstGeom prst="rect">
-            <a:avLst/>
-          </a:prstGeom>
-          <a:noFill/>
-          <a:ln>
-            <a:noFill/>
-          </a:ln>
-          <a:effectLst/>
-          <a:extLst>
-            <a:ext uri="{909E8E84-426E-40DD-AFC4-6F175D3DCCD1}">
-              <a14:hiddenFill xmlns:a14="http://schemas.microsoft.com/office/drawing/2010/main">
-                <a:solidFill>
-                  <a:schemeClr val="accent1"/>
-                </a:solidFill>
-              </a14:hiddenFill>
-            </a:ext>
-            <a:ext uri="{91240B29-F687-4F45-9708-019B960494DF}">
-              <a14:hiddenLine xmlns:a14="http://schemas.microsoft.com/office/drawing/2010/main" w="9525">
-                <a:solidFill>
-                  <a:schemeClr val="tx1"/>
-                </a:solidFill>
-                <a:miter lim="800000"/>
-                <a:headEnd/>
-                <a:tailEnd/>
-              </a14:hiddenLine>
-            </a:ext>
-            <a:ext uri="{AF507438-7753-43E0-B8FC-AC1667EBCBE1}">
-              <a14:hiddenEffects xmlns:a14="http://schemas.microsoft.com/office/drawing/2010/main">
-                <a:effectLst>
-                  <a:outerShdw dist="35921" dir="2700000" algn="ctr" rotWithShape="0">
-                    <a:schemeClr val="bg2"/>
-                  </a:outerShdw>
-                </a:effectLst>
-              </a14:hiddenEffects>
-            </a:ext>
-          </a:extLst>
-        </p:spPr>
-      </p:pic>
-    </p:spTree>
-    <p:extLst>
-      <p:ext uri="{BB962C8B-B14F-4D97-AF65-F5344CB8AC3E}">
-        <p14:creationId xmlns:p14="http://schemas.microsoft.com/office/powerpoint/2010/main" val="1743519783"/>
-      </p:ext>
-    </p:extLst>
-  </p:cSld>
-  <p:clrMapOvr>
-    <a:masterClrMapping/>
-  </p:clrMapOvr>
-  <mc:AlternateContent xmlns:mc="http://schemas.openxmlformats.org/markup-compatibility/2006">
-    <mc:Choice xmlns:p14="http://schemas.microsoft.com/office/powerpoint/2010/main" Requires="p14">
-      <p:transition spd="slow" p14:dur="2000"/>
-    </mc:Choice>
-    <mc:Fallback>
-      <p:transition spd="slow"/>
-    </mc:Fallback>
-  </mc:AlternateContent>
-  <p:timing>
-    <p:tnLst>
-      <p:par>
-        <p:cTn id="1" dur="indefinite" restart="never" nodeType="tmRoot"/>
-      </p:par>
-    </p:tnLst>
-  </p:timing>
 </p:sld>
 </file>
 

</xml_diff>

<commit_message>
Added personnel to the presentation
</commit_message>
<xml_diff>
--- a/Team 55 Project Plan.pptx
+++ b/Team 55 Project Plan.pptx
@@ -6,17 +6,18 @@
     <p:sldMasterId id="2147483680" r:id="rId2"/>
   </p:sldMasterIdLst>
   <p:notesMasterIdLst>
-    <p:notesMasterId r:id="rId11"/>
+    <p:notesMasterId r:id="rId12"/>
   </p:notesMasterIdLst>
   <p:sldIdLst>
     <p:sldId id="265" r:id="rId3"/>
     <p:sldId id="272" r:id="rId4"/>
-    <p:sldId id="271" r:id="rId5"/>
-    <p:sldId id="261" r:id="rId6"/>
-    <p:sldId id="262" r:id="rId7"/>
-    <p:sldId id="264" r:id="rId8"/>
-    <p:sldId id="263" r:id="rId9"/>
-    <p:sldId id="270" r:id="rId10"/>
+    <p:sldId id="273" r:id="rId5"/>
+    <p:sldId id="271" r:id="rId6"/>
+    <p:sldId id="261" r:id="rId7"/>
+    <p:sldId id="262" r:id="rId8"/>
+    <p:sldId id="264" r:id="rId9"/>
+    <p:sldId id="263" r:id="rId10"/>
+    <p:sldId id="270" r:id="rId11"/>
   </p:sldIdLst>
   <p:sldSz cx="9144000" cy="6858000" type="screen4x3"/>
   <p:notesSz cx="6858000" cy="9144000"/>
@@ -527,6 +528,90 @@
           <a:bodyPr/>
           <a:lstStyle/>
           <a:p>
+            <a:endParaRPr lang="en-US"/>
+          </a:p>
+        </p:txBody>
+      </p:sp>
+      <p:sp>
+        <p:nvSpPr>
+          <p:cNvPr id="4" name="Slide Number Placeholder 3"/>
+          <p:cNvSpPr>
+            <a:spLocks noGrp="1"/>
+          </p:cNvSpPr>
+          <p:nvPr>
+            <p:ph type="sldNum" sz="quarter" idx="5"/>
+          </p:nvPr>
+        </p:nvSpPr>
+        <p:spPr/>
+        <p:txBody>
+          <a:bodyPr/>
+          <a:lstStyle/>
+          <a:p>
+            <a:fld id="{58C53205-88F7-494A-B204-E8144581CAEF}" type="slidenum">
+              <a:rPr lang="en-US" smtClean="0"/>
+              <a:t>3</a:t>
+            </a:fld>
+            <a:endParaRPr lang="en-US"/>
+          </a:p>
+        </p:txBody>
+      </p:sp>
+    </p:spTree>
+    <p:extLst>
+      <p:ext uri="{BB962C8B-B14F-4D97-AF65-F5344CB8AC3E}">
+        <p14:creationId xmlns:p14="http://schemas.microsoft.com/office/powerpoint/2010/main" val="959105583"/>
+      </p:ext>
+    </p:extLst>
+  </p:cSld>
+  <p:clrMapOvr>
+    <a:masterClrMapping/>
+  </p:clrMapOvr>
+</p:notes>
+</file>
+
+<file path=ppt/notesSlides/notesSlide2.xml><?xml version="1.0" encoding="utf-8"?>
+<p:notes xmlns:a="http://schemas.openxmlformats.org/drawingml/2006/main" xmlns:r="http://schemas.openxmlformats.org/officeDocument/2006/relationships" xmlns:p="http://schemas.openxmlformats.org/presentationml/2006/main">
+  <p:cSld>
+    <p:spTree>
+      <p:nvGrpSpPr>
+        <p:cNvPr id="1" name=""/>
+        <p:cNvGrpSpPr/>
+        <p:nvPr/>
+      </p:nvGrpSpPr>
+      <p:grpSpPr>
+        <a:xfrm>
+          <a:off x="0" y="0"/>
+          <a:ext cx="0" cy="0"/>
+          <a:chOff x="0" y="0"/>
+          <a:chExt cx="0" cy="0"/>
+        </a:xfrm>
+      </p:grpSpPr>
+      <p:sp>
+        <p:nvSpPr>
+          <p:cNvPr id="2" name="Slide Image Placeholder 1"/>
+          <p:cNvSpPr>
+            <a:spLocks noGrp="1" noRot="1" noChangeAspect="1"/>
+          </p:cNvSpPr>
+          <p:nvPr>
+            <p:ph type="sldImg"/>
+          </p:nvPr>
+        </p:nvSpPr>
+        <p:spPr/>
+      </p:sp>
+      <p:sp>
+        <p:nvSpPr>
+          <p:cNvPr id="3" name="Notes Placeholder 2"/>
+          <p:cNvSpPr>
+            <a:spLocks noGrp="1"/>
+          </p:cNvSpPr>
+          <p:nvPr>
+            <p:ph type="body" idx="1"/>
+          </p:nvPr>
+        </p:nvSpPr>
+        <p:spPr/>
+        <p:txBody>
+          <a:bodyPr/>
+          <a:lstStyle/>
+          <a:p>
             <a:endParaRPr lang="en-US" dirty="0"/>
           </a:p>
           <a:p>
@@ -567,7 +652,7 @@
           <a:p>
             <a:fld id="{58C53205-88F7-494A-B204-E8144581CAEF}" type="slidenum">
               <a:rPr lang="en-US" smtClean="0"/>
-              <a:t>4</a:t>
+              <a:t>5</a:t>
             </a:fld>
             <a:endParaRPr lang="en-US"/>
           </a:p>
@@ -4400,6 +4485,206 @@
       </p:grpSpPr>
       <p:sp>
         <p:nvSpPr>
+          <p:cNvPr id="2" name="Title 1">
+            <a:extLst>
+              <a:ext uri="{FF2B5EF4-FFF2-40B4-BE49-F238E27FC236}">
+                <a16:creationId xmlns:a16="http://schemas.microsoft.com/office/drawing/2014/main" id="{64EEBB33-D2D8-2E4B-91AC-5E9981251D09}"/>
+              </a:ext>
+            </a:extLst>
+          </p:cNvPr>
+          <p:cNvSpPr>
+            <a:spLocks noGrp="1"/>
+          </p:cNvSpPr>
+          <p:nvPr>
+            <p:ph type="title"/>
+          </p:nvPr>
+        </p:nvSpPr>
+        <p:spPr/>
+        <p:txBody>
+          <a:bodyPr/>
+          <a:lstStyle/>
+          <a:p>
+            <a:r>
+              <a:rPr lang="en-US" dirty="0"/>
+              <a:t>Team 55: Personnel</a:t>
+            </a:r>
+          </a:p>
+        </p:txBody>
+      </p:sp>
+      <p:sp>
+        <p:nvSpPr>
+          <p:cNvPr id="3" name="Content Placeholder 2">
+            <a:extLst>
+              <a:ext uri="{FF2B5EF4-FFF2-40B4-BE49-F238E27FC236}">
+                <a16:creationId xmlns:a16="http://schemas.microsoft.com/office/drawing/2014/main" id="{CC19814E-4064-2244-8937-DE2CB9A8BF6B}"/>
+              </a:ext>
+            </a:extLst>
+          </p:cNvPr>
+          <p:cNvSpPr>
+            <a:spLocks noGrp="1"/>
+          </p:cNvSpPr>
+          <p:nvPr>
+            <p:ph sz="half" idx="1"/>
+          </p:nvPr>
+        </p:nvSpPr>
+        <p:spPr/>
+        <p:txBody>
+          <a:bodyPr/>
+          <a:lstStyle/>
+          <a:p>
+            <a:pPr marL="0" indent="0">
+              <a:buNone/>
+            </a:pPr>
+            <a:r>
+              <a:rPr lang="en-US" dirty="0"/>
+              <a:t>Team 55 Members:</a:t>
+            </a:r>
+          </a:p>
+          <a:p>
+            <a:r>
+              <a:rPr lang="en-US" dirty="0"/>
+              <a:t>James Davis</a:t>
+            </a:r>
+          </a:p>
+          <a:p>
+            <a:r>
+              <a:rPr lang="en-US" dirty="0" err="1"/>
+              <a:t>Haolong</a:t>
+            </a:r>
+            <a:r>
+              <a:rPr lang="en-US" dirty="0"/>
+              <a:t> Yan</a:t>
+            </a:r>
+          </a:p>
+          <a:p>
+            <a:r>
+              <a:rPr lang="en-US" dirty="0"/>
+              <a:t>Rahul </a:t>
+            </a:r>
+            <a:r>
+              <a:rPr lang="en-US" dirty="0" err="1"/>
+              <a:t>Nowlakha</a:t>
+            </a:r>
+            <a:endParaRPr lang="en-US" dirty="0"/>
+          </a:p>
+          <a:p>
+            <a:r>
+              <a:rPr lang="en-US" dirty="0"/>
+              <a:t>Joe </a:t>
+            </a:r>
+            <a:r>
+              <a:rPr lang="en-US" dirty="0" err="1"/>
+              <a:t>Kurokawa</a:t>
+            </a:r>
+            <a:endParaRPr lang="en-US" dirty="0"/>
+          </a:p>
+          <a:p>
+            <a:r>
+              <a:rPr lang="en-US" dirty="0"/>
+              <a:t>Traver Clifford</a:t>
+            </a:r>
+          </a:p>
+          <a:p>
+            <a:r>
+              <a:rPr lang="en-US" dirty="0"/>
+              <a:t>Michael Rojas</a:t>
+            </a:r>
+          </a:p>
+        </p:txBody>
+      </p:sp>
+      <p:sp>
+        <p:nvSpPr>
+          <p:cNvPr id="4" name="Content Placeholder 3">
+            <a:extLst>
+              <a:ext uri="{FF2B5EF4-FFF2-40B4-BE49-F238E27FC236}">
+                <a16:creationId xmlns:a16="http://schemas.microsoft.com/office/drawing/2014/main" id="{ABCF98DE-C1CC-624E-9CB5-306BC288215C}"/>
+              </a:ext>
+            </a:extLst>
+          </p:cNvPr>
+          <p:cNvSpPr>
+            <a:spLocks noGrp="1"/>
+          </p:cNvSpPr>
+          <p:nvPr>
+            <p:ph sz="half" idx="2"/>
+          </p:nvPr>
+        </p:nvSpPr>
+        <p:spPr/>
+        <p:txBody>
+          <a:bodyPr/>
+          <a:lstStyle/>
+          <a:p>
+            <a:pPr marL="0" indent="0">
+              <a:buNone/>
+            </a:pPr>
+            <a:r>
+              <a:rPr lang="en-US" dirty="0"/>
+              <a:t>CDC Mentors:</a:t>
+            </a:r>
+          </a:p>
+          <a:p>
+            <a:r>
+              <a:rPr lang="en-US" dirty="0"/>
+              <a:t>Jill Raudabaugh</a:t>
+            </a:r>
+          </a:p>
+          <a:p>
+            <a:r>
+              <a:rPr lang="en-US" dirty="0"/>
+              <a:t>Breanna Newton</a:t>
+            </a:r>
+          </a:p>
+          <a:p>
+            <a:endParaRPr lang="en-US" dirty="0"/>
+          </a:p>
+          <a:p>
+            <a:pPr marL="0" indent="0">
+              <a:buNone/>
+            </a:pPr>
+            <a:r>
+              <a:rPr lang="en-US" dirty="0"/>
+              <a:t>GT Mentor:</a:t>
+            </a:r>
+          </a:p>
+          <a:p>
+            <a:r>
+              <a:rPr lang="en-US" dirty="0"/>
+              <a:t>Elizabeth Shivers</a:t>
+            </a:r>
+          </a:p>
+        </p:txBody>
+      </p:sp>
+    </p:spTree>
+    <p:extLst>
+      <p:ext uri="{BB962C8B-B14F-4D97-AF65-F5344CB8AC3E}">
+        <p14:creationId xmlns:p14="http://schemas.microsoft.com/office/powerpoint/2010/main" val="4033145866"/>
+      </p:ext>
+    </p:extLst>
+  </p:cSld>
+  <p:clrMapOvr>
+    <a:masterClrMapping/>
+  </p:clrMapOvr>
+</p:sld>
+</file>
+
+<file path=ppt/slides/slide4.xml><?xml version="1.0" encoding="utf-8"?>
+<p:sld xmlns:a="http://schemas.openxmlformats.org/drawingml/2006/main" xmlns:r="http://schemas.openxmlformats.org/officeDocument/2006/relationships" xmlns:p="http://schemas.openxmlformats.org/presentationml/2006/main">
+  <p:cSld>
+    <p:spTree>
+      <p:nvGrpSpPr>
+        <p:cNvPr id="1" name=""/>
+        <p:cNvGrpSpPr/>
+        <p:nvPr/>
+      </p:nvGrpSpPr>
+      <p:grpSpPr>
+        <a:xfrm>
+          <a:off x="0" y="0"/>
+          <a:ext cx="0" cy="0"/>
+          <a:chOff x="0" y="0"/>
+          <a:chExt cx="0" cy="0"/>
+        </a:xfrm>
+      </p:grpSpPr>
+      <p:sp>
+        <p:nvSpPr>
           <p:cNvPr id="3" name="Text Placeholder 2"/>
           <p:cNvSpPr>
             <a:spLocks noGrp="1"/>
@@ -4490,7 +4775,7 @@
             <a:fld id="{079BB85F-8D7B-4121-93BF-56CC81854BC2}" type="slidenum">
               <a:rPr lang="en-US" smtClean="0"/>
               <a:pPr/>
-              <a:t>3</a:t>
+              <a:t>4</a:t>
             </a:fld>
             <a:endParaRPr lang="en-US" dirty="0"/>
           </a:p>
@@ -4809,7 +5094,7 @@
 </p:sld>
 </file>
 
-<file path=ppt/slides/slide4.xml><?xml version="1.0" encoding="utf-8"?>
+<file path=ppt/slides/slide5.xml><?xml version="1.0" encoding="utf-8"?>
 <p:sld xmlns:a="http://schemas.openxmlformats.org/drawingml/2006/main" xmlns:r="http://schemas.openxmlformats.org/officeDocument/2006/relationships" xmlns:p="http://schemas.openxmlformats.org/presentationml/2006/main">
   <p:cSld>
     <p:spTree>
@@ -4906,7 +5191,7 @@
             <a:fld id="{079BB85F-8D7B-4121-93BF-56CC81854BC2}" type="slidenum">
               <a:rPr lang="en-US" smtClean="0"/>
               <a:pPr/>
-              <a:t>4</a:t>
+              <a:t>5</a:t>
             </a:fld>
             <a:endParaRPr lang="en-US" dirty="0"/>
           </a:p>
@@ -5178,7 +5463,7 @@
 </p:sld>
 </file>
 
-<file path=ppt/slides/slide5.xml><?xml version="1.0" encoding="utf-8"?>
+<file path=ppt/slides/slide6.xml><?xml version="1.0" encoding="utf-8"?>
 <p:sld xmlns:a="http://schemas.openxmlformats.org/drawingml/2006/main" xmlns:r="http://schemas.openxmlformats.org/officeDocument/2006/relationships" xmlns:p="http://schemas.openxmlformats.org/presentationml/2006/main">
   <p:cSld>
     <p:spTree>
@@ -5272,7 +5557,7 @@
             <a:fld id="{079BB85F-8D7B-4121-93BF-56CC81854BC2}" type="slidenum">
               <a:rPr lang="en-US" smtClean="0"/>
               <a:pPr/>
-              <a:t>5</a:t>
+              <a:t>6</a:t>
             </a:fld>
             <a:endParaRPr lang="en-US" dirty="0"/>
           </a:p>
@@ -5387,405 +5672,6 @@
     <p:extLst>
       <p:ext uri="{BB962C8B-B14F-4D97-AF65-F5344CB8AC3E}">
         <p14:creationId xmlns:p14="http://schemas.microsoft.com/office/powerpoint/2010/main" val="3724602825"/>
-      </p:ext>
-    </p:extLst>
-  </p:cSld>
-  <p:clrMapOvr>
-    <a:masterClrMapping/>
-  </p:clrMapOvr>
-  <p:timing>
-    <p:tnLst>
-      <p:par>
-        <p:cTn id="1" dur="indefinite" restart="never" nodeType="tmRoot">
-          <p:childTnLst>
-            <p:seq concurrent="1" nextAc="seek">
-              <p:cTn id="2" dur="indefinite" nodeType="mainSeq">
-                <p:childTnLst>
-                  <p:par>
-                    <p:cTn id="3" fill="hold">
-                      <p:stCondLst>
-                        <p:cond delay="indefinite"/>
-                      </p:stCondLst>
-                      <p:childTnLst>
-                        <p:par>
-                          <p:cTn id="4" fill="hold">
-                            <p:stCondLst>
-                              <p:cond delay="0"/>
-                            </p:stCondLst>
-                            <p:childTnLst>
-                              <p:par>
-                                <p:cTn id="5" presetID="1" presetClass="entr" presetSubtype="0" fill="hold" grpId="0" nodeType="clickEffect">
-                                  <p:stCondLst>
-                                    <p:cond delay="0"/>
-                                  </p:stCondLst>
-                                  <p:childTnLst>
-                                    <p:set>
-                                      <p:cBhvr>
-                                        <p:cTn id="6" dur="1" fill="hold">
-                                          <p:stCondLst>
-                                            <p:cond delay="0"/>
-                                          </p:stCondLst>
-                                        </p:cTn>
-                                        <p:tgtEl>
-                                          <p:spTgt spid="3">
-                                            <p:txEl>
-                                              <p:pRg st="0" end="0"/>
-                                            </p:txEl>
-                                          </p:spTgt>
-                                        </p:tgtEl>
-                                        <p:attrNameLst>
-                                          <p:attrName>style.visibility</p:attrName>
-                                        </p:attrNameLst>
-                                      </p:cBhvr>
-                                      <p:to>
-                                        <p:strVal val="visible"/>
-                                      </p:to>
-                                    </p:set>
-                                  </p:childTnLst>
-                                </p:cTn>
-                              </p:par>
-                            </p:childTnLst>
-                          </p:cTn>
-                        </p:par>
-                      </p:childTnLst>
-                    </p:cTn>
-                  </p:par>
-                  <p:par>
-                    <p:cTn id="7" fill="hold">
-                      <p:stCondLst>
-                        <p:cond delay="indefinite"/>
-                      </p:stCondLst>
-                      <p:childTnLst>
-                        <p:par>
-                          <p:cTn id="8" fill="hold">
-                            <p:stCondLst>
-                              <p:cond delay="0"/>
-                            </p:stCondLst>
-                            <p:childTnLst>
-                              <p:par>
-                                <p:cTn id="9" presetID="1" presetClass="entr" presetSubtype="0" fill="hold" grpId="0" nodeType="clickEffect">
-                                  <p:stCondLst>
-                                    <p:cond delay="0"/>
-                                  </p:stCondLst>
-                                  <p:childTnLst>
-                                    <p:set>
-                                      <p:cBhvr>
-                                        <p:cTn id="10" dur="1" fill="hold">
-                                          <p:stCondLst>
-                                            <p:cond delay="0"/>
-                                          </p:stCondLst>
-                                        </p:cTn>
-                                        <p:tgtEl>
-                                          <p:spTgt spid="3">
-                                            <p:txEl>
-                                              <p:pRg st="1" end="1"/>
-                                            </p:txEl>
-                                          </p:spTgt>
-                                        </p:tgtEl>
-                                        <p:attrNameLst>
-                                          <p:attrName>style.visibility</p:attrName>
-                                        </p:attrNameLst>
-                                      </p:cBhvr>
-                                      <p:to>
-                                        <p:strVal val="visible"/>
-                                      </p:to>
-                                    </p:set>
-                                  </p:childTnLst>
-                                </p:cTn>
-                              </p:par>
-                            </p:childTnLst>
-                          </p:cTn>
-                        </p:par>
-                      </p:childTnLst>
-                    </p:cTn>
-                  </p:par>
-                  <p:par>
-                    <p:cTn id="11" fill="hold">
-                      <p:stCondLst>
-                        <p:cond delay="indefinite"/>
-                      </p:stCondLst>
-                      <p:childTnLst>
-                        <p:par>
-                          <p:cTn id="12" fill="hold">
-                            <p:stCondLst>
-                              <p:cond delay="0"/>
-                            </p:stCondLst>
-                            <p:childTnLst>
-                              <p:par>
-                                <p:cTn id="13" presetID="1" presetClass="entr" presetSubtype="0" fill="hold" grpId="0" nodeType="clickEffect">
-                                  <p:stCondLst>
-                                    <p:cond delay="0"/>
-                                  </p:stCondLst>
-                                  <p:childTnLst>
-                                    <p:set>
-                                      <p:cBhvr>
-                                        <p:cTn id="14" dur="1" fill="hold">
-                                          <p:stCondLst>
-                                            <p:cond delay="0"/>
-                                          </p:stCondLst>
-                                        </p:cTn>
-                                        <p:tgtEl>
-                                          <p:spTgt spid="3">
-                                            <p:txEl>
-                                              <p:pRg st="2" end="2"/>
-                                            </p:txEl>
-                                          </p:spTgt>
-                                        </p:tgtEl>
-                                        <p:attrNameLst>
-                                          <p:attrName>style.visibility</p:attrName>
-                                        </p:attrNameLst>
-                                      </p:cBhvr>
-                                      <p:to>
-                                        <p:strVal val="visible"/>
-                                      </p:to>
-                                    </p:set>
-                                  </p:childTnLst>
-                                </p:cTn>
-                              </p:par>
-                            </p:childTnLst>
-                          </p:cTn>
-                        </p:par>
-                      </p:childTnLst>
-                    </p:cTn>
-                  </p:par>
-                </p:childTnLst>
-              </p:cTn>
-              <p:prevCondLst>
-                <p:cond evt="onPrev" delay="0">
-                  <p:tgtEl>
-                    <p:sldTgt/>
-                  </p:tgtEl>
-                </p:cond>
-              </p:prevCondLst>
-              <p:nextCondLst>
-                <p:cond evt="onNext" delay="0">
-                  <p:tgtEl>
-                    <p:sldTgt/>
-                  </p:tgtEl>
-                </p:cond>
-              </p:nextCondLst>
-            </p:seq>
-          </p:childTnLst>
-        </p:cTn>
-      </p:par>
-    </p:tnLst>
-    <p:bldLst>
-      <p:bldP spid="3" grpId="0" build="p"/>
-    </p:bldLst>
-  </p:timing>
-</p:sld>
-</file>
-
-<file path=ppt/slides/slide6.xml><?xml version="1.0" encoding="utf-8"?>
-<p:sld xmlns:a="http://schemas.openxmlformats.org/drawingml/2006/main" xmlns:r="http://schemas.openxmlformats.org/officeDocument/2006/relationships" xmlns:p="http://schemas.openxmlformats.org/presentationml/2006/main">
-  <p:cSld>
-    <p:spTree>
-      <p:nvGrpSpPr>
-        <p:cNvPr id="1" name=""/>
-        <p:cNvGrpSpPr/>
-        <p:nvPr/>
-      </p:nvGrpSpPr>
-      <p:grpSpPr>
-        <a:xfrm>
-          <a:off x="0" y="0"/>
-          <a:ext cx="0" cy="0"/>
-          <a:chOff x="0" y="0"/>
-          <a:chExt cx="0" cy="0"/>
-        </a:xfrm>
-      </p:grpSpPr>
-      <p:sp>
-        <p:nvSpPr>
-          <p:cNvPr id="2" name="Title 1"/>
-          <p:cNvSpPr>
-            <a:spLocks noGrp="1"/>
-          </p:cNvSpPr>
-          <p:nvPr>
-            <p:ph type="title"/>
-          </p:nvPr>
-        </p:nvSpPr>
-        <p:spPr/>
-        <p:txBody>
-          <a:bodyPr/>
-          <a:lstStyle/>
-          <a:p>
-            <a:r>
-              <a:rPr lang="en-US" dirty="0"/>
-              <a:t>Our Role</a:t>
-            </a:r>
-          </a:p>
-        </p:txBody>
-      </p:sp>
-      <p:sp>
-        <p:nvSpPr>
-          <p:cNvPr id="3" name="Text Placeholder 2"/>
-          <p:cNvSpPr>
-            <a:spLocks noGrp="1"/>
-          </p:cNvSpPr>
-          <p:nvPr>
-            <p:ph sz="half" idx="1"/>
-          </p:nvPr>
-        </p:nvSpPr>
-        <p:spPr/>
-        <p:txBody>
-          <a:bodyPr>
-            <a:normAutofit/>
-          </a:bodyPr>
-          <a:lstStyle/>
-          <a:p>
-            <a:r>
-              <a:rPr lang="en-US" dirty="0"/>
-              <a:t>Existing NFIRS casualty form not FHIR compatible</a:t>
-            </a:r>
-          </a:p>
-          <a:p>
-            <a:r>
-              <a:rPr lang="en-US" dirty="0"/>
-              <a:t>Goal: Accept JSON/XML FHIR resources, validate, and insert into SQL database</a:t>
-            </a:r>
-          </a:p>
-          <a:p>
-            <a:r>
-              <a:rPr lang="en-US" dirty="0"/>
-              <a:t>Add visualization capabilities</a:t>
-            </a:r>
-          </a:p>
-          <a:p>
-            <a:endParaRPr lang="en-US" dirty="0"/>
-          </a:p>
-        </p:txBody>
-      </p:sp>
-      <p:sp>
-        <p:nvSpPr>
-          <p:cNvPr id="6" name="Date Placeholder 5"/>
-          <p:cNvSpPr>
-            <a:spLocks noGrp="1"/>
-          </p:cNvSpPr>
-          <p:nvPr>
-            <p:ph type="dt" sz="half" idx="10"/>
-          </p:nvPr>
-        </p:nvSpPr>
-        <p:spPr/>
-        <p:txBody>
-          <a:bodyPr/>
-          <a:lstStyle/>
-          <a:p>
-            <a:r>
-              <a:rPr lang="en-US" dirty="0"/>
-              <a:t>9/20/2020</a:t>
-            </a:r>
-          </a:p>
-        </p:txBody>
-      </p:sp>
-      <p:sp>
-        <p:nvSpPr>
-          <p:cNvPr id="5" name="Slide Number Placeholder 4"/>
-          <p:cNvSpPr>
-            <a:spLocks noGrp="1"/>
-          </p:cNvSpPr>
-          <p:nvPr>
-            <p:ph type="sldNum" sz="quarter" idx="12"/>
-          </p:nvPr>
-        </p:nvSpPr>
-        <p:spPr/>
-        <p:txBody>
-          <a:bodyPr/>
-          <a:lstStyle/>
-          <a:p>
-            <a:fld id="{079BB85F-8D7B-4121-93BF-56CC81854BC2}" type="slidenum">
-              <a:rPr lang="en-US" smtClean="0"/>
-              <a:pPr/>
-              <a:t>6</a:t>
-            </a:fld>
-            <a:endParaRPr lang="en-US" dirty="0"/>
-          </a:p>
-        </p:txBody>
-      </p:sp>
-      <p:pic>
-        <p:nvPicPr>
-          <p:cNvPr id="4098" name="Picture 2"/>
-          <p:cNvPicPr>
-            <a:picLocks noChangeAspect="1" noChangeArrowheads="1"/>
-          </p:cNvPicPr>
-          <p:nvPr/>
-        </p:nvPicPr>
-        <p:blipFill>
-          <a:blip r:embed="rId2">
-            <a:extLst>
-              <a:ext uri="{28A0092B-C50C-407E-A947-70E740481C1C}">
-                <a14:useLocalDpi xmlns:a14="http://schemas.microsoft.com/office/drawing/2010/main" val="0"/>
-              </a:ext>
-            </a:extLst>
-          </a:blip>
-          <a:srcRect/>
-          <a:stretch>
-            <a:fillRect/>
-          </a:stretch>
-        </p:blipFill>
-        <p:spPr bwMode="auto">
-          <a:xfrm>
-            <a:off x="4419600" y="1447800"/>
-            <a:ext cx="4446076" cy="3886200"/>
-          </a:xfrm>
-          <a:prstGeom prst="rect">
-            <a:avLst/>
-          </a:prstGeom>
-          <a:noFill/>
-          <a:ln>
-            <a:noFill/>
-          </a:ln>
-          <a:extLst>
-            <a:ext uri="{909E8E84-426E-40DD-AFC4-6F175D3DCCD1}">
-              <a14:hiddenFill xmlns:a14="http://schemas.microsoft.com/office/drawing/2010/main">
-                <a:solidFill>
-                  <a:schemeClr val="accent1"/>
-                </a:solidFill>
-              </a14:hiddenFill>
-            </a:ext>
-            <a:ext uri="{91240B29-F687-4F45-9708-019B960494DF}">
-              <a14:hiddenLine xmlns:a14="http://schemas.microsoft.com/office/drawing/2010/main" w="9525">
-                <a:solidFill>
-                  <a:schemeClr val="tx1"/>
-                </a:solidFill>
-                <a:miter lim="800000"/>
-                <a:headEnd/>
-                <a:tailEnd/>
-              </a14:hiddenLine>
-            </a:ext>
-          </a:extLst>
-        </p:spPr>
-      </p:pic>
-      <p:sp>
-        <p:nvSpPr>
-          <p:cNvPr id="4" name="Rectangle 3"/>
-          <p:cNvSpPr/>
-          <p:nvPr/>
-        </p:nvSpPr>
-        <p:spPr>
-          <a:xfrm>
-            <a:off x="4648200" y="5334000"/>
-            <a:ext cx="4572000" cy="261610"/>
-          </a:xfrm>
-          <a:prstGeom prst="rect">
-            <a:avLst/>
-          </a:prstGeom>
-        </p:spPr>
-        <p:txBody>
-          <a:bodyPr>
-            <a:spAutoFit/>
-          </a:bodyPr>
-          <a:lstStyle/>
-          <a:p>
-            <a:r>
-              <a:rPr lang="en-US" sz="1100" dirty="0"/>
-              <a:t>Source: NFIRS Reference Guide (2015) pp. 182</a:t>
-            </a:r>
-          </a:p>
-        </p:txBody>
-      </p:sp>
-    </p:spTree>
-    <p:extLst>
-      <p:ext uri="{BB962C8B-B14F-4D97-AF65-F5344CB8AC3E}">
-        <p14:creationId xmlns:p14="http://schemas.microsoft.com/office/powerpoint/2010/main" val="1910399480"/>
       </p:ext>
     </p:extLst>
   </p:cSld>
@@ -5994,6 +5880,67 @@
       </p:grpSpPr>
       <p:sp>
         <p:nvSpPr>
+          <p:cNvPr id="2" name="Title 1"/>
+          <p:cNvSpPr>
+            <a:spLocks noGrp="1"/>
+          </p:cNvSpPr>
+          <p:nvPr>
+            <p:ph type="title"/>
+          </p:nvPr>
+        </p:nvSpPr>
+        <p:spPr/>
+        <p:txBody>
+          <a:bodyPr/>
+          <a:lstStyle/>
+          <a:p>
+            <a:r>
+              <a:rPr lang="en-US" dirty="0"/>
+              <a:t>Our Role</a:t>
+            </a:r>
+          </a:p>
+        </p:txBody>
+      </p:sp>
+      <p:sp>
+        <p:nvSpPr>
+          <p:cNvPr id="3" name="Text Placeholder 2"/>
+          <p:cNvSpPr>
+            <a:spLocks noGrp="1"/>
+          </p:cNvSpPr>
+          <p:nvPr>
+            <p:ph sz="half" idx="1"/>
+          </p:nvPr>
+        </p:nvSpPr>
+        <p:spPr/>
+        <p:txBody>
+          <a:bodyPr>
+            <a:normAutofit/>
+          </a:bodyPr>
+          <a:lstStyle/>
+          <a:p>
+            <a:r>
+              <a:rPr lang="en-US" dirty="0"/>
+              <a:t>Existing NFIRS casualty form not FHIR compatible</a:t>
+            </a:r>
+          </a:p>
+          <a:p>
+            <a:r>
+              <a:rPr lang="en-US" dirty="0"/>
+              <a:t>Goal: Accept JSON/XML FHIR resources, validate, and insert into SQL database</a:t>
+            </a:r>
+          </a:p>
+          <a:p>
+            <a:r>
+              <a:rPr lang="en-US" dirty="0"/>
+              <a:t>Add visualization capabilities</a:t>
+            </a:r>
+          </a:p>
+          <a:p>
+            <a:endParaRPr lang="en-US" dirty="0"/>
+          </a:p>
+        </p:txBody>
+      </p:sp>
+      <p:sp>
+        <p:nvSpPr>
           <p:cNvPr id="6" name="Date Placeholder 5"/>
           <p:cNvSpPr>
             <a:spLocks noGrp="1"/>
@@ -6033,6 +5980,344 @@
               <a:rPr lang="en-US" smtClean="0"/>
               <a:pPr/>
               <a:t>7</a:t>
+            </a:fld>
+            <a:endParaRPr lang="en-US" dirty="0"/>
+          </a:p>
+        </p:txBody>
+      </p:sp>
+      <p:pic>
+        <p:nvPicPr>
+          <p:cNvPr id="4098" name="Picture 2"/>
+          <p:cNvPicPr>
+            <a:picLocks noChangeAspect="1" noChangeArrowheads="1"/>
+          </p:cNvPicPr>
+          <p:nvPr/>
+        </p:nvPicPr>
+        <p:blipFill>
+          <a:blip r:embed="rId2">
+            <a:extLst>
+              <a:ext uri="{28A0092B-C50C-407E-A947-70E740481C1C}">
+                <a14:useLocalDpi xmlns:a14="http://schemas.microsoft.com/office/drawing/2010/main" val="0"/>
+              </a:ext>
+            </a:extLst>
+          </a:blip>
+          <a:srcRect/>
+          <a:stretch>
+            <a:fillRect/>
+          </a:stretch>
+        </p:blipFill>
+        <p:spPr bwMode="auto">
+          <a:xfrm>
+            <a:off x="4419600" y="1447800"/>
+            <a:ext cx="4446076" cy="3886200"/>
+          </a:xfrm>
+          <a:prstGeom prst="rect">
+            <a:avLst/>
+          </a:prstGeom>
+          <a:noFill/>
+          <a:ln>
+            <a:noFill/>
+          </a:ln>
+          <a:extLst>
+            <a:ext uri="{909E8E84-426E-40DD-AFC4-6F175D3DCCD1}">
+              <a14:hiddenFill xmlns:a14="http://schemas.microsoft.com/office/drawing/2010/main">
+                <a:solidFill>
+                  <a:schemeClr val="accent1"/>
+                </a:solidFill>
+              </a14:hiddenFill>
+            </a:ext>
+            <a:ext uri="{91240B29-F687-4F45-9708-019B960494DF}">
+              <a14:hiddenLine xmlns:a14="http://schemas.microsoft.com/office/drawing/2010/main" w="9525">
+                <a:solidFill>
+                  <a:schemeClr val="tx1"/>
+                </a:solidFill>
+                <a:miter lim="800000"/>
+                <a:headEnd/>
+                <a:tailEnd/>
+              </a14:hiddenLine>
+            </a:ext>
+          </a:extLst>
+        </p:spPr>
+      </p:pic>
+      <p:sp>
+        <p:nvSpPr>
+          <p:cNvPr id="4" name="Rectangle 3"/>
+          <p:cNvSpPr/>
+          <p:nvPr/>
+        </p:nvSpPr>
+        <p:spPr>
+          <a:xfrm>
+            <a:off x="4648200" y="5334000"/>
+            <a:ext cx="4572000" cy="261610"/>
+          </a:xfrm>
+          <a:prstGeom prst="rect">
+            <a:avLst/>
+          </a:prstGeom>
+        </p:spPr>
+        <p:txBody>
+          <a:bodyPr>
+            <a:spAutoFit/>
+          </a:bodyPr>
+          <a:lstStyle/>
+          <a:p>
+            <a:r>
+              <a:rPr lang="en-US" sz="1100" dirty="0"/>
+              <a:t>Source: NFIRS Reference Guide (2015) pp. 182</a:t>
+            </a:r>
+          </a:p>
+        </p:txBody>
+      </p:sp>
+    </p:spTree>
+    <p:extLst>
+      <p:ext uri="{BB962C8B-B14F-4D97-AF65-F5344CB8AC3E}">
+        <p14:creationId xmlns:p14="http://schemas.microsoft.com/office/powerpoint/2010/main" val="1910399480"/>
+      </p:ext>
+    </p:extLst>
+  </p:cSld>
+  <p:clrMapOvr>
+    <a:masterClrMapping/>
+  </p:clrMapOvr>
+  <p:timing>
+    <p:tnLst>
+      <p:par>
+        <p:cTn id="1" dur="indefinite" restart="never" nodeType="tmRoot">
+          <p:childTnLst>
+            <p:seq concurrent="1" nextAc="seek">
+              <p:cTn id="2" dur="indefinite" nodeType="mainSeq">
+                <p:childTnLst>
+                  <p:par>
+                    <p:cTn id="3" fill="hold">
+                      <p:stCondLst>
+                        <p:cond delay="indefinite"/>
+                      </p:stCondLst>
+                      <p:childTnLst>
+                        <p:par>
+                          <p:cTn id="4" fill="hold">
+                            <p:stCondLst>
+                              <p:cond delay="0"/>
+                            </p:stCondLst>
+                            <p:childTnLst>
+                              <p:par>
+                                <p:cTn id="5" presetID="1" presetClass="entr" presetSubtype="0" fill="hold" grpId="0" nodeType="clickEffect">
+                                  <p:stCondLst>
+                                    <p:cond delay="0"/>
+                                  </p:stCondLst>
+                                  <p:childTnLst>
+                                    <p:set>
+                                      <p:cBhvr>
+                                        <p:cTn id="6" dur="1" fill="hold">
+                                          <p:stCondLst>
+                                            <p:cond delay="0"/>
+                                          </p:stCondLst>
+                                        </p:cTn>
+                                        <p:tgtEl>
+                                          <p:spTgt spid="3">
+                                            <p:txEl>
+                                              <p:pRg st="0" end="0"/>
+                                            </p:txEl>
+                                          </p:spTgt>
+                                        </p:tgtEl>
+                                        <p:attrNameLst>
+                                          <p:attrName>style.visibility</p:attrName>
+                                        </p:attrNameLst>
+                                      </p:cBhvr>
+                                      <p:to>
+                                        <p:strVal val="visible"/>
+                                      </p:to>
+                                    </p:set>
+                                  </p:childTnLst>
+                                </p:cTn>
+                              </p:par>
+                            </p:childTnLst>
+                          </p:cTn>
+                        </p:par>
+                      </p:childTnLst>
+                    </p:cTn>
+                  </p:par>
+                  <p:par>
+                    <p:cTn id="7" fill="hold">
+                      <p:stCondLst>
+                        <p:cond delay="indefinite"/>
+                      </p:stCondLst>
+                      <p:childTnLst>
+                        <p:par>
+                          <p:cTn id="8" fill="hold">
+                            <p:stCondLst>
+                              <p:cond delay="0"/>
+                            </p:stCondLst>
+                            <p:childTnLst>
+                              <p:par>
+                                <p:cTn id="9" presetID="1" presetClass="entr" presetSubtype="0" fill="hold" grpId="0" nodeType="clickEffect">
+                                  <p:stCondLst>
+                                    <p:cond delay="0"/>
+                                  </p:stCondLst>
+                                  <p:childTnLst>
+                                    <p:set>
+                                      <p:cBhvr>
+                                        <p:cTn id="10" dur="1" fill="hold">
+                                          <p:stCondLst>
+                                            <p:cond delay="0"/>
+                                          </p:stCondLst>
+                                        </p:cTn>
+                                        <p:tgtEl>
+                                          <p:spTgt spid="3">
+                                            <p:txEl>
+                                              <p:pRg st="1" end="1"/>
+                                            </p:txEl>
+                                          </p:spTgt>
+                                        </p:tgtEl>
+                                        <p:attrNameLst>
+                                          <p:attrName>style.visibility</p:attrName>
+                                        </p:attrNameLst>
+                                      </p:cBhvr>
+                                      <p:to>
+                                        <p:strVal val="visible"/>
+                                      </p:to>
+                                    </p:set>
+                                  </p:childTnLst>
+                                </p:cTn>
+                              </p:par>
+                            </p:childTnLst>
+                          </p:cTn>
+                        </p:par>
+                      </p:childTnLst>
+                    </p:cTn>
+                  </p:par>
+                  <p:par>
+                    <p:cTn id="11" fill="hold">
+                      <p:stCondLst>
+                        <p:cond delay="indefinite"/>
+                      </p:stCondLst>
+                      <p:childTnLst>
+                        <p:par>
+                          <p:cTn id="12" fill="hold">
+                            <p:stCondLst>
+                              <p:cond delay="0"/>
+                            </p:stCondLst>
+                            <p:childTnLst>
+                              <p:par>
+                                <p:cTn id="13" presetID="1" presetClass="entr" presetSubtype="0" fill="hold" grpId="0" nodeType="clickEffect">
+                                  <p:stCondLst>
+                                    <p:cond delay="0"/>
+                                  </p:stCondLst>
+                                  <p:childTnLst>
+                                    <p:set>
+                                      <p:cBhvr>
+                                        <p:cTn id="14" dur="1" fill="hold">
+                                          <p:stCondLst>
+                                            <p:cond delay="0"/>
+                                          </p:stCondLst>
+                                        </p:cTn>
+                                        <p:tgtEl>
+                                          <p:spTgt spid="3">
+                                            <p:txEl>
+                                              <p:pRg st="2" end="2"/>
+                                            </p:txEl>
+                                          </p:spTgt>
+                                        </p:tgtEl>
+                                        <p:attrNameLst>
+                                          <p:attrName>style.visibility</p:attrName>
+                                        </p:attrNameLst>
+                                      </p:cBhvr>
+                                      <p:to>
+                                        <p:strVal val="visible"/>
+                                      </p:to>
+                                    </p:set>
+                                  </p:childTnLst>
+                                </p:cTn>
+                              </p:par>
+                            </p:childTnLst>
+                          </p:cTn>
+                        </p:par>
+                      </p:childTnLst>
+                    </p:cTn>
+                  </p:par>
+                </p:childTnLst>
+              </p:cTn>
+              <p:prevCondLst>
+                <p:cond evt="onPrev" delay="0">
+                  <p:tgtEl>
+                    <p:sldTgt/>
+                  </p:tgtEl>
+                </p:cond>
+              </p:prevCondLst>
+              <p:nextCondLst>
+                <p:cond evt="onNext" delay="0">
+                  <p:tgtEl>
+                    <p:sldTgt/>
+                  </p:tgtEl>
+                </p:cond>
+              </p:nextCondLst>
+            </p:seq>
+          </p:childTnLst>
+        </p:cTn>
+      </p:par>
+    </p:tnLst>
+    <p:bldLst>
+      <p:bldP spid="3" grpId="0" build="p"/>
+    </p:bldLst>
+  </p:timing>
+</p:sld>
+</file>
+
+<file path=ppt/slides/slide8.xml><?xml version="1.0" encoding="utf-8"?>
+<p:sld xmlns:a="http://schemas.openxmlformats.org/drawingml/2006/main" xmlns:r="http://schemas.openxmlformats.org/officeDocument/2006/relationships" xmlns:p="http://schemas.openxmlformats.org/presentationml/2006/main">
+  <p:cSld>
+    <p:spTree>
+      <p:nvGrpSpPr>
+        <p:cNvPr id="1" name=""/>
+        <p:cNvGrpSpPr/>
+        <p:nvPr/>
+      </p:nvGrpSpPr>
+      <p:grpSpPr>
+        <a:xfrm>
+          <a:off x="0" y="0"/>
+          <a:ext cx="0" cy="0"/>
+          <a:chOff x="0" y="0"/>
+          <a:chExt cx="0" cy="0"/>
+        </a:xfrm>
+      </p:grpSpPr>
+      <p:sp>
+        <p:nvSpPr>
+          <p:cNvPr id="6" name="Date Placeholder 5"/>
+          <p:cNvSpPr>
+            <a:spLocks noGrp="1"/>
+          </p:cNvSpPr>
+          <p:nvPr>
+            <p:ph type="dt" sz="half" idx="10"/>
+          </p:nvPr>
+        </p:nvSpPr>
+        <p:spPr/>
+        <p:txBody>
+          <a:bodyPr/>
+          <a:lstStyle/>
+          <a:p>
+            <a:r>
+              <a:rPr lang="en-US" dirty="0"/>
+              <a:t>9/20/2020</a:t>
+            </a:r>
+          </a:p>
+        </p:txBody>
+      </p:sp>
+      <p:sp>
+        <p:nvSpPr>
+          <p:cNvPr id="5" name="Slide Number Placeholder 4"/>
+          <p:cNvSpPr>
+            <a:spLocks noGrp="1"/>
+          </p:cNvSpPr>
+          <p:nvPr>
+            <p:ph type="sldNum" sz="quarter" idx="12"/>
+          </p:nvPr>
+        </p:nvSpPr>
+        <p:spPr/>
+        <p:txBody>
+          <a:bodyPr/>
+          <a:lstStyle/>
+          <a:p>
+            <a:fld id="{079BB85F-8D7B-4121-93BF-56CC81854BC2}" type="slidenum">
+              <a:rPr lang="en-US" smtClean="0"/>
+              <a:pPr/>
+              <a:t>8</a:t>
             </a:fld>
             <a:endParaRPr lang="en-US" dirty="0"/>
           </a:p>
@@ -6114,7 +6399,7 @@
 </p:sld>
 </file>
 
-<file path=ppt/slides/slide8.xml><?xml version="1.0" encoding="utf-8"?>
+<file path=ppt/slides/slide9.xml><?xml version="1.0" encoding="utf-8"?>
 <p:sld xmlns:a="http://schemas.openxmlformats.org/drawingml/2006/main" xmlns:r="http://schemas.openxmlformats.org/officeDocument/2006/relationships" xmlns:p="http://schemas.openxmlformats.org/presentationml/2006/main">
   <p:cSld>
     <p:spTree>

</xml_diff>